<commit_message>
Added in multiple Threshold slide
</commit_message>
<xml_diff>
--- a/Presentation/presentation-draft.pptx
+++ b/Presentation/presentation-draft.pptx
@@ -5,10 +5,10 @@
     <p:sldMasterId id="2147483660" r:id="rId1"/>
   </p:sldMasterIdLst>
   <p:notesMasterIdLst>
-    <p:notesMasterId r:id="rId20"/>
+    <p:notesMasterId r:id="rId21"/>
   </p:notesMasterIdLst>
   <p:handoutMasterIdLst>
-    <p:handoutMasterId r:id="rId21"/>
+    <p:handoutMasterId r:id="rId22"/>
   </p:handoutMasterIdLst>
   <p:sldIdLst>
     <p:sldId id="256" r:id="rId2"/>
@@ -24,11 +24,12 @@
     <p:sldId id="278" r:id="rId12"/>
     <p:sldId id="277" r:id="rId13"/>
     <p:sldId id="273" r:id="rId14"/>
-    <p:sldId id="275" r:id="rId15"/>
-    <p:sldId id="272" r:id="rId16"/>
-    <p:sldId id="271" r:id="rId17"/>
-    <p:sldId id="270" r:id="rId18"/>
-    <p:sldId id="279" r:id="rId19"/>
+    <p:sldId id="280" r:id="rId15"/>
+    <p:sldId id="275" r:id="rId16"/>
+    <p:sldId id="272" r:id="rId17"/>
+    <p:sldId id="271" r:id="rId18"/>
+    <p:sldId id="270" r:id="rId19"/>
+    <p:sldId id="279" r:id="rId20"/>
   </p:sldIdLst>
   <p:sldSz cx="9144000" cy="6858000" type="screen4x3"/>
   <p:notesSz cx="6858000" cy="9144000"/>
@@ -159,7 +160,7 @@
   </p:defaultTextStyle>
   <p:extLst>
     <p:ext uri="{EFAFB233-063F-42B5-8137-9DF3F51BA10A}">
-      <p15:sldGuideLst xmlns="" xmlns:p15="http://schemas.microsoft.com/office/powerpoint/2012/main">
+      <p15:sldGuideLst xmlns:p15="http://schemas.microsoft.com/office/powerpoint/2012/main" xmlns="">
         <p15:guide id="1" orient="horz" pos="2160">
           <p15:clr>
             <a:srgbClr val="A4A3A4"/>
@@ -377,7 +378,7 @@
     </p:spTree>
     <p:extLst>
       <p:ext uri="{BB962C8B-B14F-4D97-AF65-F5344CB8AC3E}">
-        <p14:creationId xmlns:p14="http://schemas.microsoft.com/office/powerpoint/2010/main" xmlns="" val="3904371776"/>
+        <p14:creationId xmlns="" xmlns:p14="http://schemas.microsoft.com/office/powerpoint/2010/main" val="3904371776"/>
       </p:ext>
     </p:extLst>
   </p:cSld>
@@ -687,7 +688,7 @@
     </p:spTree>
     <p:extLst>
       <p:ext uri="{BB962C8B-B14F-4D97-AF65-F5344CB8AC3E}">
-        <p14:creationId xmlns:p14="http://schemas.microsoft.com/office/powerpoint/2010/main" xmlns="" val="2384980960"/>
+        <p14:creationId xmlns="" xmlns:p14="http://schemas.microsoft.com/office/powerpoint/2010/main" val="2384980960"/>
       </p:ext>
     </p:extLst>
   </p:cSld>
@@ -859,7 +860,7 @@
           </a:ln>
           <a:extLst>
             <a:ext uri="{91240B29-F687-4f45-9708-019B960494DF}">
-              <a14:hiddenLine xmlns:a14="http://schemas.microsoft.com/office/drawing/2010/main" xmlns="" w="9525">
+              <a14:hiddenLine xmlns="" xmlns:a14="http://schemas.microsoft.com/office/drawing/2010/main" w="9525">
                 <a:solidFill>
                   <a:srgbClr val="000000"/>
                 </a:solidFill>
@@ -908,7 +909,7 @@
           </a:ln>
           <a:extLst>
             <a:ext uri="{91240B29-F687-4f45-9708-019B960494DF}">
-              <a14:hiddenLine xmlns:a14="http://schemas.microsoft.com/office/drawing/2010/main" xmlns="" w="9525">
+              <a14:hiddenLine xmlns="" xmlns:a14="http://schemas.microsoft.com/office/drawing/2010/main" w="9525">
                 <a:solidFill>
                   <a:srgbClr val="000000"/>
                 </a:solidFill>
@@ -945,7 +946,7 @@
           <a:blip r:embed="rId2">
             <a:extLst>
               <a:ext uri="{28A0092B-C50C-407E-A947-70E740481C1C}">
-                <a14:useLocalDpi xmlns:a14="http://schemas.microsoft.com/office/drawing/2010/main" xmlns="" val="0"/>
+                <a14:useLocalDpi xmlns="" xmlns:a14="http://schemas.microsoft.com/office/drawing/2010/main" val="0"/>
               </a:ext>
             </a:extLst>
           </a:blip>
@@ -968,14 +969,14 @@
           </a:ln>
           <a:extLst>
             <a:ext uri="{909E8E84-426E-40dd-AFC4-6F175D3DCCD1}">
-              <a14:hiddenFill xmlns:a14="http://schemas.microsoft.com/office/drawing/2010/main" xmlns="">
+              <a14:hiddenFill xmlns="" xmlns:a14="http://schemas.microsoft.com/office/drawing/2010/main">
                 <a:solidFill>
                   <a:srgbClr val="FFFFFF"/>
                 </a:solidFill>
               </a14:hiddenFill>
             </a:ext>
             <a:ext uri="{91240B29-F687-4f45-9708-019B960494DF}">
-              <a14:hiddenLine xmlns:a14="http://schemas.microsoft.com/office/drawing/2010/main" xmlns="" w="9525">
+              <a14:hiddenLine xmlns="" xmlns:a14="http://schemas.microsoft.com/office/drawing/2010/main" w="9525">
                 <a:solidFill>
                   <a:srgbClr val="000000"/>
                 </a:solidFill>
@@ -1065,7 +1066,7 @@
     </p:spTree>
     <p:extLst>
       <p:ext uri="{BB962C8B-B14F-4D97-AF65-F5344CB8AC3E}">
-        <p14:creationId xmlns:p14="http://schemas.microsoft.com/office/powerpoint/2010/main" xmlns="" val="4106179330"/>
+        <p14:creationId xmlns="" xmlns:p14="http://schemas.microsoft.com/office/powerpoint/2010/main" val="4106179330"/>
       </p:ext>
     </p:extLst>
   </p:cSld>
@@ -1325,7 +1326,7 @@
     </p:spTree>
     <p:extLst>
       <p:ext uri="{BB962C8B-B14F-4D97-AF65-F5344CB8AC3E}">
-        <p14:creationId xmlns:p14="http://schemas.microsoft.com/office/powerpoint/2010/main" xmlns="" val="2330010810"/>
+        <p14:creationId xmlns="" xmlns:p14="http://schemas.microsoft.com/office/powerpoint/2010/main" val="2330010810"/>
       </p:ext>
     </p:extLst>
   </p:cSld>
@@ -1620,7 +1621,7 @@
     </p:spTree>
     <p:extLst>
       <p:ext uri="{BB962C8B-B14F-4D97-AF65-F5344CB8AC3E}">
-        <p14:creationId xmlns:p14="http://schemas.microsoft.com/office/powerpoint/2010/main" xmlns="" val="614527096"/>
+        <p14:creationId xmlns="" xmlns:p14="http://schemas.microsoft.com/office/powerpoint/2010/main" val="614527096"/>
       </p:ext>
     </p:extLst>
   </p:cSld>
@@ -1911,7 +1912,7 @@
     </p:spTree>
     <p:extLst>
       <p:ext uri="{BB962C8B-B14F-4D97-AF65-F5344CB8AC3E}">
-        <p14:creationId xmlns:p14="http://schemas.microsoft.com/office/powerpoint/2010/main" xmlns="" val="2270394588"/>
+        <p14:creationId xmlns="" xmlns:p14="http://schemas.microsoft.com/office/powerpoint/2010/main" val="2270394588"/>
       </p:ext>
     </p:extLst>
   </p:cSld>
@@ -2227,7 +2228,7 @@
     </p:spTree>
     <p:extLst>
       <p:ext uri="{BB962C8B-B14F-4D97-AF65-F5344CB8AC3E}">
-        <p14:creationId xmlns:p14="http://schemas.microsoft.com/office/powerpoint/2010/main" xmlns="" val="4155116445"/>
+        <p14:creationId xmlns="" xmlns:p14="http://schemas.microsoft.com/office/powerpoint/2010/main" val="4155116445"/>
       </p:ext>
     </p:extLst>
   </p:cSld>
@@ -2543,7 +2544,7 @@
     </p:spTree>
     <p:extLst>
       <p:ext uri="{BB962C8B-B14F-4D97-AF65-F5344CB8AC3E}">
-        <p14:creationId xmlns:p14="http://schemas.microsoft.com/office/powerpoint/2010/main" xmlns="" val="3368182647"/>
+        <p14:creationId xmlns="" xmlns:p14="http://schemas.microsoft.com/office/powerpoint/2010/main" val="3368182647"/>
       </p:ext>
     </p:extLst>
   </p:cSld>
@@ -2851,7 +2852,7 @@
     </p:spTree>
     <p:extLst>
       <p:ext uri="{BB962C8B-B14F-4D97-AF65-F5344CB8AC3E}">
-        <p14:creationId xmlns:p14="http://schemas.microsoft.com/office/powerpoint/2010/main" xmlns="" val="985965977"/>
+        <p14:creationId xmlns="" xmlns:p14="http://schemas.microsoft.com/office/powerpoint/2010/main" val="985965977"/>
       </p:ext>
     </p:extLst>
   </p:cSld>
@@ -2973,7 +2974,7 @@
     </p:spTree>
     <p:extLst>
       <p:ext uri="{BB962C8B-B14F-4D97-AF65-F5344CB8AC3E}">
-        <p14:creationId xmlns:p14="http://schemas.microsoft.com/office/powerpoint/2010/main" xmlns="" val="4294105242"/>
+        <p14:creationId xmlns="" xmlns:p14="http://schemas.microsoft.com/office/powerpoint/2010/main" val="4294105242"/>
       </p:ext>
     </p:extLst>
   </p:cSld>
@@ -3107,7 +3108,7 @@
     </p:spTree>
     <p:extLst>
       <p:ext uri="{BB962C8B-B14F-4D97-AF65-F5344CB8AC3E}">
-        <p14:creationId xmlns:p14="http://schemas.microsoft.com/office/powerpoint/2010/main" xmlns="" val="2818520777"/>
+        <p14:creationId xmlns="" xmlns:p14="http://schemas.microsoft.com/office/powerpoint/2010/main" val="2818520777"/>
       </p:ext>
     </p:extLst>
   </p:cSld>
@@ -3333,7 +3334,7 @@
     </p:spTree>
     <p:extLst>
       <p:ext uri="{BB962C8B-B14F-4D97-AF65-F5344CB8AC3E}">
-        <p14:creationId xmlns:p14="http://schemas.microsoft.com/office/powerpoint/2010/main" xmlns="" val="1022151706"/>
+        <p14:creationId xmlns="" xmlns:p14="http://schemas.microsoft.com/office/powerpoint/2010/main" val="1022151706"/>
       </p:ext>
     </p:extLst>
   </p:cSld>
@@ -3597,7 +3598,7 @@
     </p:spTree>
     <p:extLst>
       <p:ext uri="{BB962C8B-B14F-4D97-AF65-F5344CB8AC3E}">
-        <p14:creationId xmlns:p14="http://schemas.microsoft.com/office/powerpoint/2010/main" xmlns="" val="2785841850"/>
+        <p14:creationId xmlns="" xmlns:p14="http://schemas.microsoft.com/office/powerpoint/2010/main" val="2785841850"/>
       </p:ext>
     </p:extLst>
   </p:cSld>
@@ -3892,7 +3893,7 @@
     </p:spTree>
     <p:extLst>
       <p:ext uri="{BB962C8B-B14F-4D97-AF65-F5344CB8AC3E}">
-        <p14:creationId xmlns:p14="http://schemas.microsoft.com/office/powerpoint/2010/main" xmlns="" val="178877595"/>
+        <p14:creationId xmlns="" xmlns:p14="http://schemas.microsoft.com/office/powerpoint/2010/main" val="178877595"/>
       </p:ext>
     </p:extLst>
   </p:cSld>
@@ -4078,7 +4079,7 @@
     </p:spTree>
     <p:extLst>
       <p:ext uri="{BB962C8B-B14F-4D97-AF65-F5344CB8AC3E}">
-        <p14:creationId xmlns:p14="http://schemas.microsoft.com/office/powerpoint/2010/main" xmlns="" val="1991616225"/>
+        <p14:creationId xmlns="" xmlns:p14="http://schemas.microsoft.com/office/powerpoint/2010/main" val="1991616225"/>
       </p:ext>
     </p:extLst>
   </p:cSld>
@@ -4228,7 +4229,7 @@
     </p:spTree>
     <p:extLst>
       <p:ext uri="{BB962C8B-B14F-4D97-AF65-F5344CB8AC3E}">
-        <p14:creationId xmlns:p14="http://schemas.microsoft.com/office/powerpoint/2010/main" xmlns="" val="3811359751"/>
+        <p14:creationId xmlns="" xmlns:p14="http://schemas.microsoft.com/office/powerpoint/2010/main" val="3811359751"/>
       </p:ext>
     </p:extLst>
   </p:cSld>
@@ -4459,7 +4460,7 @@
     </p:spTree>
     <p:extLst>
       <p:ext uri="{BB962C8B-B14F-4D97-AF65-F5344CB8AC3E}">
-        <p14:creationId xmlns:p14="http://schemas.microsoft.com/office/powerpoint/2010/main" xmlns="" val="3100148321"/>
+        <p14:creationId xmlns="" xmlns:p14="http://schemas.microsoft.com/office/powerpoint/2010/main" val="3100148321"/>
       </p:ext>
     </p:extLst>
   </p:cSld>
@@ -4688,7 +4689,7 @@
     </p:spTree>
     <p:extLst>
       <p:ext uri="{BB962C8B-B14F-4D97-AF65-F5344CB8AC3E}">
-        <p14:creationId xmlns:p14="http://schemas.microsoft.com/office/powerpoint/2010/main" xmlns="" val="183857643"/>
+        <p14:creationId xmlns="" xmlns:p14="http://schemas.microsoft.com/office/powerpoint/2010/main" val="183857643"/>
       </p:ext>
     </p:extLst>
   </p:cSld>
@@ -4952,7 +4953,7 @@
     </p:spTree>
     <p:extLst>
       <p:ext uri="{BB962C8B-B14F-4D97-AF65-F5344CB8AC3E}">
-        <p14:creationId xmlns:p14="http://schemas.microsoft.com/office/powerpoint/2010/main" xmlns="" val="459280236"/>
+        <p14:creationId xmlns="" xmlns:p14="http://schemas.microsoft.com/office/powerpoint/2010/main" val="459280236"/>
       </p:ext>
     </p:extLst>
   </p:cSld>
@@ -5014,7 +5015,7 @@
           </a:ln>
           <a:extLst>
             <a:ext uri="{91240B29-F687-4f45-9708-019B960494DF}">
-              <a14:hiddenLine xmlns:a14="http://schemas.microsoft.com/office/drawing/2010/main" xmlns="" w="9525">
+              <a14:hiddenLine xmlns="" xmlns:a14="http://schemas.microsoft.com/office/drawing/2010/main" w="9525">
                 <a:solidFill>
                   <a:srgbClr val="000000"/>
                 </a:solidFill>
@@ -5051,7 +5052,7 @@
           <a:blip r:embed="rId19">
             <a:extLst>
               <a:ext uri="{28A0092B-C50C-407E-A947-70E740481C1C}">
-                <a14:useLocalDpi xmlns:a14="http://schemas.microsoft.com/office/drawing/2010/main" xmlns="" val="0"/>
+                <a14:useLocalDpi xmlns="" xmlns:a14="http://schemas.microsoft.com/office/drawing/2010/main" val="0"/>
               </a:ext>
             </a:extLst>
           </a:blip>
@@ -5074,14 +5075,14 @@
           </a:ln>
           <a:extLst>
             <a:ext uri="{909E8E84-426E-40dd-AFC4-6F175D3DCCD1}">
-              <a14:hiddenFill xmlns:a14="http://schemas.microsoft.com/office/drawing/2010/main" xmlns="">
+              <a14:hiddenFill xmlns="" xmlns:a14="http://schemas.microsoft.com/office/drawing/2010/main">
                 <a:solidFill>
                   <a:srgbClr val="FFFFFF"/>
                 </a:solidFill>
               </a14:hiddenFill>
             </a:ext>
             <a:ext uri="{91240B29-F687-4f45-9708-019B960494DF}">
-              <a14:hiddenLine xmlns:a14="http://schemas.microsoft.com/office/drawing/2010/main" xmlns="" w="9525">
+              <a14:hiddenLine xmlns="" xmlns:a14="http://schemas.microsoft.com/office/drawing/2010/main" w="9525">
                 <a:solidFill>
                   <a:srgbClr val="000000"/>
                 </a:solidFill>
@@ -5117,14 +5118,14 @@
           </a:ln>
           <a:extLst>
             <a:ext uri="{909E8E84-426E-40dd-AFC4-6F175D3DCCD1}">
-              <a14:hiddenFill xmlns:a14="http://schemas.microsoft.com/office/drawing/2010/main" xmlns="">
+              <a14:hiddenFill xmlns="" xmlns:a14="http://schemas.microsoft.com/office/drawing/2010/main">
                 <a:solidFill>
                   <a:srgbClr val="FFFFFF"/>
                 </a:solidFill>
               </a14:hiddenFill>
             </a:ext>
             <a:ext uri="{91240B29-F687-4f45-9708-019B960494DF}">
-              <a14:hiddenLine xmlns:a14="http://schemas.microsoft.com/office/drawing/2010/main" xmlns="" w="9525">
+              <a14:hiddenLine xmlns="" xmlns:a14="http://schemas.microsoft.com/office/drawing/2010/main" w="9525">
                 <a:solidFill>
                   <a:srgbClr val="000000"/>
                 </a:solidFill>
@@ -5134,7 +5135,7 @@
               </a14:hiddenLine>
             </a:ext>
             <a:ext uri="{FAA26D3D-D897-4be2-8F04-BA451C77F1D7}">
-              <ma14:placeholderFlag xmlns:ma14="http://schemas.microsoft.com/office/mac/drawingml/2011/main" xmlns="" val="1"/>
+              <ma14:placeholderFlag xmlns="" xmlns:ma14="http://schemas.microsoft.com/office/mac/drawingml/2011/main" val="1"/>
             </a:ext>
           </a:extLst>
         </p:spPr>
@@ -5179,14 +5180,14 @@
           </a:ln>
           <a:extLst>
             <a:ext uri="{909E8E84-426E-40dd-AFC4-6F175D3DCCD1}">
-              <a14:hiddenFill xmlns:a14="http://schemas.microsoft.com/office/drawing/2010/main" xmlns="">
+              <a14:hiddenFill xmlns="" xmlns:a14="http://schemas.microsoft.com/office/drawing/2010/main">
                 <a:solidFill>
                   <a:srgbClr val="FFFFFF"/>
                 </a:solidFill>
               </a14:hiddenFill>
             </a:ext>
             <a:ext uri="{91240B29-F687-4f45-9708-019B960494DF}">
-              <a14:hiddenLine xmlns:a14="http://schemas.microsoft.com/office/drawing/2010/main" xmlns="" w="9525">
+              <a14:hiddenLine xmlns="" xmlns:a14="http://schemas.microsoft.com/office/drawing/2010/main" w="9525">
                 <a:solidFill>
                   <a:srgbClr val="000000"/>
                 </a:solidFill>
@@ -5196,7 +5197,7 @@
               </a14:hiddenLine>
             </a:ext>
             <a:ext uri="{FAA26D3D-D897-4be2-8F04-BA451C77F1D7}">
-              <ma14:placeholderFlag xmlns:ma14="http://schemas.microsoft.com/office/mac/drawingml/2011/main" xmlns="" val="1"/>
+              <ma14:placeholderFlag xmlns="" xmlns:ma14="http://schemas.microsoft.com/office/mac/drawingml/2011/main" val="1"/>
             </a:ext>
           </a:extLst>
         </p:spPr>
@@ -5964,7 +5965,7 @@
             <a:alphaModFix amt="81000"/>
             <a:extLst>
               <a:ext uri="{28A0092B-C50C-407E-A947-70E740481C1C}">
-                <a14:useLocalDpi xmlns:a14="http://schemas.microsoft.com/office/drawing/2010/main" xmlns="" val="0"/>
+                <a14:useLocalDpi xmlns="" xmlns:a14="http://schemas.microsoft.com/office/drawing/2010/main" val="0"/>
               </a:ext>
             </a:extLst>
           </a:blip>
@@ -6217,7 +6218,7 @@
     </p:spTree>
     <p:extLst>
       <p:ext uri="{BB962C8B-B14F-4D97-AF65-F5344CB8AC3E}">
-        <p14:creationId xmlns:p14="http://schemas.microsoft.com/office/powerpoint/2010/main" xmlns="" val="610192193"/>
+        <p14:creationId xmlns="" xmlns:p14="http://schemas.microsoft.com/office/powerpoint/2010/main" val="610192193"/>
       </p:ext>
     </p:extLst>
   </p:cSld>
@@ -6372,7 +6373,7 @@
     </p:spTree>
     <p:extLst>
       <p:ext uri="{BB962C8B-B14F-4D97-AF65-F5344CB8AC3E}">
-        <p14:creationId xmlns:p14="http://schemas.microsoft.com/office/powerpoint/2010/main" xmlns="" val="3682975160"/>
+        <p14:creationId xmlns="" xmlns:p14="http://schemas.microsoft.com/office/powerpoint/2010/main" val="3682975160"/>
       </p:ext>
     </p:extLst>
   </p:cSld>
@@ -6446,7 +6447,7 @@
           <a:blip r:embed="rId2">
             <a:extLst>
               <a:ext uri="{28A0092B-C50C-407E-A947-70E740481C1C}">
-                <a14:useLocalDpi xmlns:a14="http://schemas.microsoft.com/office/drawing/2010/main" xmlns="" val="0"/>
+                <a14:useLocalDpi xmlns="" xmlns:a14="http://schemas.microsoft.com/office/drawing/2010/main" val="0"/>
               </a:ext>
             </a:extLst>
           </a:blip>
@@ -6522,7 +6523,7 @@
     </p:spTree>
     <p:extLst>
       <p:ext uri="{BB962C8B-B14F-4D97-AF65-F5344CB8AC3E}">
-        <p14:creationId xmlns:p14="http://schemas.microsoft.com/office/powerpoint/2010/main" xmlns="" val="2176588019"/>
+        <p14:creationId xmlns="" xmlns:p14="http://schemas.microsoft.com/office/powerpoint/2010/main" val="2176588019"/>
       </p:ext>
     </p:extLst>
   </p:cSld>
@@ -6592,7 +6593,7 @@
             <p:ph idx="1"/>
             <p:extLst>
               <p:ext uri="{D42A27DB-BD31-4B8C-83A1-F6EECF244321}">
-                <p14:modId xmlns:p14="http://schemas.microsoft.com/office/powerpoint/2010/main" xmlns="" val="1342030354"/>
+                <p14:modId xmlns="" xmlns:p14="http://schemas.microsoft.com/office/powerpoint/2010/main" val="1342030354"/>
               </p:ext>
             </p:extLst>
           </p:nvPr>
@@ -8447,7 +8448,7 @@
     </p:spTree>
     <p:extLst>
       <p:ext uri="{BB962C8B-B14F-4D97-AF65-F5344CB8AC3E}">
-        <p14:creationId xmlns:p14="http://schemas.microsoft.com/office/powerpoint/2010/main" xmlns="" val="3598000523"/>
+        <p14:creationId xmlns="" xmlns:p14="http://schemas.microsoft.com/office/powerpoint/2010/main" val="3598000523"/>
       </p:ext>
     </p:extLst>
   </p:cSld>
@@ -8500,13 +8501,606 @@
           <a:lstStyle/>
           <a:p>
             <a:r>
-              <a:rPr lang="en-US" sz="3200" u="sng" dirty="0"/>
+              <a:rPr lang="en-US" u="sng" dirty="0" smtClean="0"/>
               <a:t>Findings</a:t>
             </a:r>
-            <a:endParaRPr lang="en-US" sz="3200" dirty="0"/>
-          </a:p>
-        </p:txBody>
-      </p:sp>
+            <a:endParaRPr lang="en-US" u="sng" dirty="0"/>
+          </a:p>
+        </p:txBody>
+      </p:sp>
+      <p:graphicFrame>
+        <p:nvGraphicFramePr>
+          <p:cNvPr id="9" name="Content Placeholder 8"/>
+          <p:cNvGraphicFramePr>
+            <a:graphicFrameLocks noGrp="1"/>
+          </p:cNvGraphicFramePr>
+          <p:nvPr>
+            <p:ph idx="1"/>
+          </p:nvPr>
+        </p:nvGraphicFramePr>
+        <p:xfrm>
+          <a:off x="457200" y="1371600"/>
+          <a:ext cx="7331724" cy="3438183"/>
+        </p:xfrm>
+        <a:graphic>
+          <a:graphicData uri="http://schemas.openxmlformats.org/drawingml/2006/table">
+            <a:tbl>
+              <a:tblPr firstRow="1" bandRow="1">
+                <a:tableStyleId>{5C22544A-7EE6-4342-B048-85BDC9FD1C3A}</a:tableStyleId>
+              </a:tblPr>
+              <a:tblGrid>
+                <a:gridCol w="2443908"/>
+                <a:gridCol w="2443908"/>
+                <a:gridCol w="2443908"/>
+              </a:tblGrid>
+              <a:tr h="491169">
+                <a:tc>
+                  <a:txBody>
+                    <a:bodyPr/>
+                    <a:lstStyle/>
+                    <a:p>
+                      <a:pPr algn="ctr"/>
+                      <a:r>
+                        <a:rPr lang="en-US" dirty="0" smtClean="0"/>
+                        <a:t>Threshold</a:t>
+                      </a:r>
+                      <a:endParaRPr lang="en-US" dirty="0"/>
+                    </a:p>
+                  </a:txBody>
+                  <a:tcPr/>
+                </a:tc>
+                <a:tc>
+                  <a:txBody>
+                    <a:bodyPr/>
+                    <a:lstStyle/>
+                    <a:p>
+                      <a:pPr algn="ctr"/>
+                      <a:r>
+                        <a:rPr lang="en-US" dirty="0" smtClean="0"/>
+                        <a:t>False</a:t>
+                      </a:r>
+                      <a:r>
+                        <a:rPr lang="en-US" baseline="0" dirty="0" smtClean="0"/>
+                        <a:t> Negative Rate</a:t>
+                      </a:r>
+                      <a:endParaRPr lang="en-US" dirty="0"/>
+                    </a:p>
+                  </a:txBody>
+                  <a:tcPr/>
+                </a:tc>
+                <a:tc>
+                  <a:txBody>
+                    <a:bodyPr/>
+                    <a:lstStyle/>
+                    <a:p>
+                      <a:pPr algn="ctr"/>
+                      <a:r>
+                        <a:rPr lang="en-US" dirty="0" smtClean="0"/>
+                        <a:t>Apparent Error Rate</a:t>
+                      </a:r>
+                      <a:endParaRPr lang="en-US" dirty="0"/>
+                    </a:p>
+                  </a:txBody>
+                  <a:tcPr/>
+                </a:tc>
+              </a:tr>
+              <a:tr h="491169">
+                <a:tc>
+                  <a:txBody>
+                    <a:bodyPr/>
+                    <a:lstStyle/>
+                    <a:p>
+                      <a:pPr algn="ctr"/>
+                      <a:r>
+                        <a:rPr lang="en-US" dirty="0" smtClean="0">
+                          <a:solidFill>
+                            <a:srgbClr val="000000"/>
+                          </a:solidFill>
+                        </a:rPr>
+                        <a:t>0.5</a:t>
+                      </a:r>
+                      <a:endParaRPr lang="en-US" dirty="0">
+                        <a:solidFill>
+                          <a:srgbClr val="000000"/>
+                        </a:solidFill>
+                      </a:endParaRPr>
+                    </a:p>
+                  </a:txBody>
+                  <a:tcPr/>
+                </a:tc>
+                <a:tc>
+                  <a:txBody>
+                    <a:bodyPr/>
+                    <a:lstStyle/>
+                    <a:p>
+                      <a:pPr algn="ctr"/>
+                      <a:r>
+                        <a:rPr lang="en-US" sz="1800" b="0" i="0" kern="1200" dirty="0" smtClean="0">
+                          <a:solidFill>
+                            <a:srgbClr val="000000"/>
+                          </a:solidFill>
+                          <a:latin typeface="+mn-lt"/>
+                          <a:ea typeface="+mn-ea"/>
+                          <a:cs typeface="+mn-cs"/>
+                        </a:rPr>
+                        <a:t>0.70588235</a:t>
+                      </a:r>
+                      <a:endParaRPr lang="en-US" dirty="0">
+                        <a:solidFill>
+                          <a:srgbClr val="000000"/>
+                        </a:solidFill>
+                      </a:endParaRPr>
+                    </a:p>
+                  </a:txBody>
+                  <a:tcPr/>
+                </a:tc>
+                <a:tc>
+                  <a:txBody>
+                    <a:bodyPr/>
+                    <a:lstStyle/>
+                    <a:p>
+                      <a:pPr algn="ctr"/>
+                      <a:r>
+                        <a:rPr lang="en-US" sz="1800" b="0" i="0" kern="1200" dirty="0" smtClean="0">
+                          <a:solidFill>
+                            <a:srgbClr val="000000"/>
+                          </a:solidFill>
+                          <a:latin typeface="+mn-lt"/>
+                          <a:ea typeface="+mn-ea"/>
+                          <a:cs typeface="+mn-cs"/>
+                        </a:rPr>
+                        <a:t>0.07976366</a:t>
+                      </a:r>
+                      <a:endParaRPr lang="en-US" dirty="0">
+                        <a:solidFill>
+                          <a:srgbClr val="000000"/>
+                        </a:solidFill>
+                      </a:endParaRPr>
+                    </a:p>
+                  </a:txBody>
+                  <a:tcPr/>
+                </a:tc>
+              </a:tr>
+              <a:tr h="491169">
+                <a:tc>
+                  <a:txBody>
+                    <a:bodyPr/>
+                    <a:lstStyle/>
+                    <a:p>
+                      <a:pPr algn="ctr"/>
+                      <a:r>
+                        <a:rPr lang="en-US" sz="1800" b="0" i="0" kern="1200" dirty="0" smtClean="0">
+                          <a:solidFill>
+                            <a:srgbClr val="000000"/>
+                          </a:solidFill>
+                          <a:latin typeface="+mn-lt"/>
+                          <a:ea typeface="+mn-ea"/>
+                          <a:cs typeface="+mn-cs"/>
+                        </a:rPr>
+                        <a:t>0.1</a:t>
+                      </a:r>
+                      <a:endParaRPr lang="en-US" dirty="0">
+                        <a:solidFill>
+                          <a:srgbClr val="000000"/>
+                        </a:solidFill>
+                      </a:endParaRPr>
+                    </a:p>
+                  </a:txBody>
+                  <a:tcPr/>
+                </a:tc>
+                <a:tc>
+                  <a:txBody>
+                    <a:bodyPr/>
+                    <a:lstStyle/>
+                    <a:p>
+                      <a:pPr algn="ctr"/>
+                      <a:r>
+                        <a:rPr lang="en-US" sz="1800" b="0" i="0" kern="1200" dirty="0" smtClean="0">
+                          <a:solidFill>
+                            <a:srgbClr val="000000"/>
+                          </a:solidFill>
+                          <a:latin typeface="+mn-lt"/>
+                          <a:ea typeface="+mn-ea"/>
+                          <a:cs typeface="+mn-cs"/>
+                        </a:rPr>
+                        <a:t>0.48366013</a:t>
+                      </a:r>
+                      <a:endParaRPr lang="en-US" dirty="0">
+                        <a:solidFill>
+                          <a:srgbClr val="000000"/>
+                        </a:solidFill>
+                      </a:endParaRPr>
+                    </a:p>
+                  </a:txBody>
+                  <a:tcPr/>
+                </a:tc>
+                <a:tc>
+                  <a:txBody>
+                    <a:bodyPr/>
+                    <a:lstStyle/>
+                    <a:p>
+                      <a:pPr algn="ctr"/>
+                      <a:r>
+                        <a:rPr lang="en-US" sz="1800" b="0" i="0" kern="1200" dirty="0" smtClean="0">
+                          <a:solidFill>
+                            <a:srgbClr val="000000"/>
+                          </a:solidFill>
+                          <a:latin typeface="+mn-lt"/>
+                          <a:ea typeface="+mn-ea"/>
+                          <a:cs typeface="+mn-cs"/>
+                        </a:rPr>
+                        <a:t>0.06351551</a:t>
+                      </a:r>
+                      <a:endParaRPr lang="en-US" dirty="0">
+                        <a:solidFill>
+                          <a:srgbClr val="000000"/>
+                        </a:solidFill>
+                      </a:endParaRPr>
+                    </a:p>
+                  </a:txBody>
+                  <a:tcPr/>
+                </a:tc>
+              </a:tr>
+              <a:tr h="491169">
+                <a:tc>
+                  <a:txBody>
+                    <a:bodyPr/>
+                    <a:lstStyle/>
+                    <a:p>
+                      <a:pPr algn="ctr"/>
+                      <a:r>
+                        <a:rPr lang="en-US" sz="1800" b="0" i="0" kern="1200" dirty="0" smtClean="0">
+                          <a:solidFill>
+                            <a:srgbClr val="000000"/>
+                          </a:solidFill>
+                          <a:latin typeface="+mn-lt"/>
+                          <a:ea typeface="+mn-ea"/>
+                          <a:cs typeface="+mn-cs"/>
+                        </a:rPr>
+                        <a:t>0.05</a:t>
+                      </a:r>
+                      <a:endParaRPr lang="en-US" dirty="0">
+                        <a:solidFill>
+                          <a:srgbClr val="000000"/>
+                        </a:solidFill>
+                      </a:endParaRPr>
+                    </a:p>
+                  </a:txBody>
+                  <a:tcPr/>
+                </a:tc>
+                <a:tc>
+                  <a:txBody>
+                    <a:bodyPr/>
+                    <a:lstStyle/>
+                    <a:p>
+                      <a:pPr algn="ctr"/>
+                      <a:r>
+                        <a:rPr lang="en-US" sz="1800" b="0" i="0" kern="1200" dirty="0" smtClean="0">
+                          <a:solidFill>
+                            <a:srgbClr val="000000"/>
+                          </a:solidFill>
+                          <a:latin typeface="+mn-lt"/>
+                          <a:ea typeface="+mn-ea"/>
+                          <a:cs typeface="+mn-cs"/>
+                        </a:rPr>
+                        <a:t>0.45751634 </a:t>
+                      </a:r>
+                      <a:endParaRPr lang="en-US" dirty="0">
+                        <a:solidFill>
+                          <a:srgbClr val="000000"/>
+                        </a:solidFill>
+                      </a:endParaRPr>
+                    </a:p>
+                  </a:txBody>
+                  <a:tcPr/>
+                </a:tc>
+                <a:tc>
+                  <a:txBody>
+                    <a:bodyPr/>
+                    <a:lstStyle/>
+                    <a:p>
+                      <a:pPr algn="ctr"/>
+                      <a:r>
+                        <a:rPr lang="en-US" sz="1800" b="0" i="0" kern="1200" dirty="0" smtClean="0">
+                          <a:solidFill>
+                            <a:srgbClr val="000000"/>
+                          </a:solidFill>
+                          <a:latin typeface="+mn-lt"/>
+                          <a:ea typeface="+mn-ea"/>
+                          <a:cs typeface="+mn-cs"/>
+                        </a:rPr>
+                        <a:t>0.07828656</a:t>
+                      </a:r>
+                      <a:endParaRPr lang="en-US" dirty="0">
+                        <a:solidFill>
+                          <a:srgbClr val="000000"/>
+                        </a:solidFill>
+                      </a:endParaRPr>
+                    </a:p>
+                  </a:txBody>
+                  <a:tcPr/>
+                </a:tc>
+              </a:tr>
+              <a:tr h="491169">
+                <a:tc>
+                  <a:txBody>
+                    <a:bodyPr/>
+                    <a:lstStyle/>
+                    <a:p>
+                      <a:pPr algn="ctr"/>
+                      <a:r>
+                        <a:rPr lang="en-US" sz="1800" b="0" i="0" kern="1200" dirty="0" smtClean="0">
+                          <a:solidFill>
+                            <a:srgbClr val="000000"/>
+                          </a:solidFill>
+                          <a:latin typeface="+mn-lt"/>
+                          <a:ea typeface="+mn-ea"/>
+                          <a:cs typeface="+mn-cs"/>
+                        </a:rPr>
+                        <a:t>0.01</a:t>
+                      </a:r>
+                      <a:endParaRPr lang="en-US" dirty="0">
+                        <a:solidFill>
+                          <a:srgbClr val="000000"/>
+                        </a:solidFill>
+                      </a:endParaRPr>
+                    </a:p>
+                  </a:txBody>
+                  <a:tcPr/>
+                </a:tc>
+                <a:tc>
+                  <a:txBody>
+                    <a:bodyPr/>
+                    <a:lstStyle/>
+                    <a:p>
+                      <a:pPr algn="ctr"/>
+                      <a:r>
+                        <a:rPr lang="en-US" sz="1800" b="0" i="0" kern="1200" dirty="0" smtClean="0">
+                          <a:solidFill>
+                            <a:srgbClr val="000000"/>
+                          </a:solidFill>
+                          <a:latin typeface="+mn-lt"/>
+                          <a:ea typeface="+mn-ea"/>
+                          <a:cs typeface="+mn-cs"/>
+                        </a:rPr>
+                        <a:t>0.1633987 </a:t>
+                      </a:r>
+                      <a:endParaRPr lang="en-US" dirty="0">
+                        <a:solidFill>
+                          <a:srgbClr val="000000"/>
+                        </a:solidFill>
+                      </a:endParaRPr>
+                    </a:p>
+                  </a:txBody>
+                  <a:tcPr/>
+                </a:tc>
+                <a:tc>
+                  <a:txBody>
+                    <a:bodyPr/>
+                    <a:lstStyle/>
+                    <a:p>
+                      <a:pPr algn="ctr"/>
+                      <a:r>
+                        <a:rPr lang="en-US" sz="1800" b="0" i="0" kern="1200" dirty="0" smtClean="0">
+                          <a:solidFill>
+                            <a:srgbClr val="000000"/>
+                          </a:solidFill>
+                          <a:latin typeface="+mn-lt"/>
+                          <a:ea typeface="+mn-ea"/>
+                          <a:cs typeface="+mn-cs"/>
+                        </a:rPr>
+                        <a:t>0.0760709</a:t>
+                      </a:r>
+                      <a:endParaRPr lang="en-US" dirty="0">
+                        <a:solidFill>
+                          <a:srgbClr val="000000"/>
+                        </a:solidFill>
+                      </a:endParaRPr>
+                    </a:p>
+                  </a:txBody>
+                  <a:tcPr/>
+                </a:tc>
+              </a:tr>
+              <a:tr h="491169">
+                <a:tc>
+                  <a:txBody>
+                    <a:bodyPr/>
+                    <a:lstStyle/>
+                    <a:p>
+                      <a:pPr algn="ctr"/>
+                      <a:r>
+                        <a:rPr lang="en-US" sz="1800" b="0" i="0" kern="1200" dirty="0" smtClean="0">
+                          <a:solidFill>
+                            <a:srgbClr val="00B050"/>
+                          </a:solidFill>
+                          <a:latin typeface="+mn-lt"/>
+                          <a:ea typeface="+mn-ea"/>
+                          <a:cs typeface="+mn-cs"/>
+                        </a:rPr>
+                        <a:t>0.005</a:t>
+                      </a:r>
+                      <a:endParaRPr lang="en-US" dirty="0">
+                        <a:solidFill>
+                          <a:srgbClr val="00B050"/>
+                        </a:solidFill>
+                      </a:endParaRPr>
+                    </a:p>
+                  </a:txBody>
+                  <a:tcPr/>
+                </a:tc>
+                <a:tc>
+                  <a:txBody>
+                    <a:bodyPr/>
+                    <a:lstStyle/>
+                    <a:p>
+                      <a:pPr algn="ctr"/>
+                      <a:r>
+                        <a:rPr lang="en-US" sz="1800" b="0" i="0" kern="1200" dirty="0" smtClean="0">
+                          <a:solidFill>
+                            <a:srgbClr val="00B050"/>
+                          </a:solidFill>
+                          <a:latin typeface="+mn-lt"/>
+                          <a:ea typeface="+mn-ea"/>
+                          <a:cs typeface="+mn-cs"/>
+                        </a:rPr>
+                        <a:t>0.03921569 </a:t>
+                      </a:r>
+                      <a:endParaRPr lang="en-US" dirty="0">
+                        <a:solidFill>
+                          <a:srgbClr val="00B050"/>
+                        </a:solidFill>
+                      </a:endParaRPr>
+                    </a:p>
+                  </a:txBody>
+                  <a:tcPr/>
+                </a:tc>
+                <a:tc>
+                  <a:txBody>
+                    <a:bodyPr/>
+                    <a:lstStyle/>
+                    <a:p>
+                      <a:pPr algn="ctr"/>
+                      <a:r>
+                        <a:rPr lang="en-US" sz="1800" b="0" i="0" kern="1200" dirty="0" smtClean="0">
+                          <a:solidFill>
+                            <a:srgbClr val="00B050"/>
+                          </a:solidFill>
+                          <a:latin typeface="+mn-lt"/>
+                          <a:ea typeface="+mn-ea"/>
+                          <a:cs typeface="+mn-cs"/>
+                        </a:rPr>
+                        <a:t>0.07976366</a:t>
+                      </a:r>
+                      <a:endParaRPr lang="en-US" dirty="0">
+                        <a:solidFill>
+                          <a:srgbClr val="00B050"/>
+                        </a:solidFill>
+                      </a:endParaRPr>
+                    </a:p>
+                  </a:txBody>
+                  <a:tcPr>
+                    <a:lnB w="12700" cap="flat" cmpd="sng" algn="ctr">
+                      <a:solidFill>
+                        <a:schemeClr val="tx1"/>
+                      </a:solidFill>
+                      <a:prstDash val="solid"/>
+                      <a:round/>
+                      <a:headEnd type="none" w="med" len="med"/>
+                      <a:tailEnd type="none" w="med" len="med"/>
+                    </a:lnB>
+                  </a:tcPr>
+                </a:tc>
+              </a:tr>
+              <a:tr h="491169">
+                <a:tc>
+                  <a:txBody>
+                    <a:bodyPr/>
+                    <a:lstStyle/>
+                    <a:p>
+                      <a:pPr algn="ctr"/>
+                      <a:r>
+                        <a:rPr lang="en-US" sz="1800" b="0" i="0" kern="1200" dirty="0" smtClean="0">
+                          <a:solidFill>
+                            <a:srgbClr val="000000"/>
+                          </a:solidFill>
+                          <a:latin typeface="+mn-lt"/>
+                          <a:ea typeface="+mn-ea"/>
+                          <a:cs typeface="+mn-cs"/>
+                        </a:rPr>
+                        <a:t>0.001</a:t>
+                      </a:r>
+                      <a:endParaRPr lang="en-US" dirty="0">
+                        <a:solidFill>
+                          <a:srgbClr val="000000"/>
+                        </a:solidFill>
+                      </a:endParaRPr>
+                    </a:p>
+                  </a:txBody>
+                  <a:tcPr/>
+                </a:tc>
+                <a:tc>
+                  <a:txBody>
+                    <a:bodyPr/>
+                    <a:lstStyle/>
+                    <a:p>
+                      <a:pPr algn="ctr"/>
+                      <a:r>
+                        <a:rPr lang="en-US" sz="1800" b="0" i="0" kern="1200" dirty="0" smtClean="0">
+                          <a:solidFill>
+                            <a:srgbClr val="000000"/>
+                          </a:solidFill>
+                          <a:latin typeface="+mn-lt"/>
+                          <a:ea typeface="+mn-ea"/>
+                          <a:cs typeface="+mn-cs"/>
+                        </a:rPr>
+                        <a:t>0.0000000</a:t>
+                      </a:r>
+                      <a:endParaRPr lang="en-US" dirty="0">
+                        <a:solidFill>
+                          <a:srgbClr val="000000"/>
+                        </a:solidFill>
+                      </a:endParaRPr>
+                    </a:p>
+                  </a:txBody>
+                  <a:tcPr/>
+                </a:tc>
+                <a:tc>
+                  <a:txBody>
+                    <a:bodyPr/>
+                    <a:lstStyle/>
+                    <a:p>
+                      <a:pPr marL="0" marR="0" indent="0" algn="ctr" defTabSz="914400" rtl="0" eaLnBrk="1" fontAlgn="auto" latinLnBrk="0" hangingPunct="1">
+                        <a:lnSpc>
+                          <a:spcPct val="100000"/>
+                        </a:lnSpc>
+                        <a:spcBef>
+                          <a:spcPts val="0"/>
+                        </a:spcBef>
+                        <a:spcAft>
+                          <a:spcPts val="0"/>
+                        </a:spcAft>
+                        <a:buClrTx/>
+                        <a:buSzTx/>
+                        <a:buFontTx/>
+                        <a:buNone/>
+                        <a:tabLst/>
+                        <a:defRPr/>
+                      </a:pPr>
+                      <a:r>
+                        <a:rPr lang="en-US" sz="1800" b="0" i="0" kern="1200" dirty="0" smtClean="0">
+                          <a:solidFill>
+                            <a:srgbClr val="000000"/>
+                          </a:solidFill>
+                          <a:latin typeface="+mn-lt"/>
+                          <a:ea typeface="+mn-ea"/>
+                          <a:cs typeface="+mn-cs"/>
+                        </a:rPr>
+                        <a:t>0.1329394</a:t>
+                      </a:r>
+                      <a:endParaRPr lang="en-US" dirty="0" smtClean="0">
+                        <a:solidFill>
+                          <a:srgbClr val="000000"/>
+                        </a:solidFill>
+                      </a:endParaRPr>
+                    </a:p>
+                  </a:txBody>
+                  <a:tcPr>
+                    <a:lnT w="12700" cap="flat" cmpd="sng" algn="ctr">
+                      <a:solidFill>
+                        <a:schemeClr val="tx1"/>
+                      </a:solidFill>
+                      <a:prstDash val="solid"/>
+                      <a:round/>
+                      <a:headEnd type="none" w="med" len="med"/>
+                      <a:tailEnd type="none" w="med" len="med"/>
+                    </a:lnT>
+                  </a:tcPr>
+                </a:tc>
+              </a:tr>
+            </a:tbl>
+          </a:graphicData>
+        </a:graphic>
+      </p:graphicFrame>
       <p:sp>
         <p:nvSpPr>
           <p:cNvPr id="4" name="Date Placeholder 3"/>
@@ -8565,55 +9159,7 @@
           </a:p>
         </p:txBody>
       </p:sp>
-      <p:sp>
-        <p:nvSpPr>
-          <p:cNvPr id="7" name="Content Placeholder 6"/>
-          <p:cNvSpPr>
-            <a:spLocks noGrp="1"/>
-          </p:cNvSpPr>
-          <p:nvPr>
-            <p:ph idx="1"/>
-          </p:nvPr>
-        </p:nvSpPr>
-        <p:spPr/>
-        <p:txBody>
-          <a:bodyPr/>
-          <a:lstStyle/>
-          <a:p>
-            <a:pPr marL="0" indent="0">
-              <a:buNone/>
-            </a:pPr>
-            <a:endParaRPr lang="en-US" sz="2800" dirty="0" smtClean="0"/>
-          </a:p>
-          <a:p>
-            <a:pPr marL="228600" lvl="1" indent="0">
-              <a:buNone/>
-            </a:pPr>
-            <a:r>
-              <a:rPr lang="en-US" sz="2800" dirty="0" smtClean="0"/>
-              <a:t>With </a:t>
-            </a:r>
-            <a:r>
-              <a:rPr lang="en-US" sz="2800" dirty="0"/>
-              <a:t>our choice of threshold (0.005), Naïve Bayes classifier mistakenly classifies 7.98% of mushrooms, and 3.92% of poisonous mushrooms are wrongly </a:t>
-            </a:r>
-            <a:r>
-              <a:rPr lang="en-US" sz="2800" dirty="0" smtClean="0"/>
-              <a:t>identified as being edible.</a:t>
-            </a:r>
-            <a:endParaRPr lang="en-US" sz="2800" dirty="0"/>
-          </a:p>
-          <a:p>
-            <a:endParaRPr lang="en-US" dirty="0"/>
-          </a:p>
-        </p:txBody>
-      </p:sp>
     </p:spTree>
-    <p:extLst>
-      <p:ext uri="{BB962C8B-B14F-4D97-AF65-F5344CB8AC3E}">
-        <p14:creationId xmlns:p14="http://schemas.microsoft.com/office/powerpoint/2010/main" xmlns="" val="1662710540"/>
-      </p:ext>
-    </p:extLst>
   </p:cSld>
   <p:clrMapOvr>
     <a:masterClrMapping/>
@@ -8621,13 +9167,6 @@
   <p:transition>
     <p:fade/>
   </p:transition>
-  <p:timing>
-    <p:tnLst>
-      <p:par>
-        <p:cTn id="1" dur="indefinite" restart="never" nodeType="tmRoot"/>
-      </p:par>
-    </p:tnLst>
-  </p:timing>
 </p:sld>
 </file>
 
@@ -8664,59 +9203,10 @@
           <a:lstStyle/>
           <a:p>
             <a:r>
-              <a:rPr lang="en-US" sz="3200" u="sng" dirty="0" smtClean="0"/>
-              <a:t>Discussion</a:t>
-            </a:r>
-            <a:endParaRPr lang="en-US" sz="3200" u="sng" dirty="0"/>
-          </a:p>
-        </p:txBody>
-      </p:sp>
-      <p:sp>
-        <p:nvSpPr>
-          <p:cNvPr id="3" name="Content Placeholder 2"/>
-          <p:cNvSpPr>
-            <a:spLocks noGrp="1"/>
-          </p:cNvSpPr>
-          <p:nvPr>
-            <p:ph idx="1"/>
-          </p:nvPr>
-        </p:nvSpPr>
-        <p:spPr/>
-        <p:txBody>
-          <a:bodyPr/>
-          <a:lstStyle/>
-          <a:p>
-            <a:pPr marL="0" indent="0">
-              <a:buNone/>
-            </a:pPr>
-            <a:r>
-              <a:rPr lang="en-US" sz="2800" b="1" dirty="0" smtClean="0"/>
-              <a:t>Assumption</a:t>
-            </a:r>
-          </a:p>
-          <a:p>
-            <a:pPr marL="0" indent="0">
-              <a:buNone/>
-            </a:pPr>
-            <a:endParaRPr lang="en-US" dirty="0"/>
-          </a:p>
-          <a:p>
-            <a:pPr marL="228600" lvl="1" indent="0">
-              <a:buNone/>
-            </a:pPr>
-            <a:r>
-              <a:rPr lang="en-US" sz="2800" dirty="0" smtClean="0"/>
-              <a:t>Main assumption of the report, also the assumption of Naïve Bayes classifier, is, </a:t>
-            </a:r>
-            <a:r>
-              <a:rPr lang="en-US" sz="2800" b="1" dirty="0" smtClean="0"/>
-              <a:t>independence between features given class labels</a:t>
-            </a:r>
-            <a:r>
-              <a:rPr lang="en-US" sz="2800" dirty="0" smtClean="0"/>
-              <a:t>. Although with a strong assumption, Naïve Bayes still have high accuracy in classifying. Its robustness remains an open question.</a:t>
-            </a:r>
-            <a:endParaRPr lang="en-US" sz="2800" dirty="0"/>
+              <a:rPr lang="en-US" sz="3200" u="sng" dirty="0"/>
+              <a:t>Findings</a:t>
+            </a:r>
+            <a:endParaRPr lang="en-US" sz="3200" dirty="0"/>
           </a:p>
         </p:txBody>
       </p:sp>
@@ -8778,10 +9268,53 @@
           </a:p>
         </p:txBody>
       </p:sp>
+      <p:sp>
+        <p:nvSpPr>
+          <p:cNvPr id="7" name="Content Placeholder 6"/>
+          <p:cNvSpPr>
+            <a:spLocks noGrp="1"/>
+          </p:cNvSpPr>
+          <p:nvPr>
+            <p:ph idx="1"/>
+          </p:nvPr>
+        </p:nvSpPr>
+        <p:spPr/>
+        <p:txBody>
+          <a:bodyPr/>
+          <a:lstStyle/>
+          <a:p>
+            <a:pPr marL="0" indent="0">
+              <a:buNone/>
+            </a:pPr>
+            <a:endParaRPr lang="en-US" sz="2800" dirty="0" smtClean="0"/>
+          </a:p>
+          <a:p>
+            <a:pPr marL="228600" lvl="1" indent="0">
+              <a:buNone/>
+            </a:pPr>
+            <a:r>
+              <a:rPr lang="en-US" sz="2800" dirty="0" smtClean="0"/>
+              <a:t>With </a:t>
+            </a:r>
+            <a:r>
+              <a:rPr lang="en-US" sz="2800" dirty="0"/>
+              <a:t>our choice of threshold (0.005), Naïve Bayes classifier mistakenly classifies 7.98% of mushrooms, and 3.92% of poisonous mushrooms are wrongly </a:t>
+            </a:r>
+            <a:r>
+              <a:rPr lang="en-US" sz="2800" dirty="0" smtClean="0"/>
+              <a:t>identified as being edible.</a:t>
+            </a:r>
+            <a:endParaRPr lang="en-US" sz="2800" dirty="0"/>
+          </a:p>
+          <a:p>
+            <a:endParaRPr lang="en-US" dirty="0"/>
+          </a:p>
+        </p:txBody>
+      </p:sp>
     </p:spTree>
     <p:extLst>
       <p:ext uri="{BB962C8B-B14F-4D97-AF65-F5344CB8AC3E}">
-        <p14:creationId xmlns:p14="http://schemas.microsoft.com/office/powerpoint/2010/main" xmlns="" val="2676136856"/>
+        <p14:creationId xmlns="" xmlns:p14="http://schemas.microsoft.com/office/powerpoint/2010/main" val="1662710540"/>
       </p:ext>
     </p:extLst>
   </p:cSld>
@@ -8834,10 +9367,10 @@
           <a:lstStyle/>
           <a:p>
             <a:r>
-              <a:rPr lang="en-US" sz="3200" u="sng" dirty="0"/>
+              <a:rPr lang="en-US" sz="3200" u="sng" dirty="0" smtClean="0"/>
               <a:t>Discussion</a:t>
             </a:r>
-            <a:endParaRPr lang="en-US" sz="3200" dirty="0"/>
+            <a:endParaRPr lang="en-US" sz="3200" u="sng" dirty="0"/>
           </a:p>
         </p:txBody>
       </p:sp>
@@ -8861,59 +9394,30 @@
             </a:pPr>
             <a:r>
               <a:rPr lang="en-US" sz="2800" b="1" dirty="0" smtClean="0"/>
-              <a:t>Scaling to Big data</a:t>
-            </a:r>
-          </a:p>
-          <a:p>
-            <a:pPr marL="228600" lvl="1" indent="0">
-              <a:spcBef>
-                <a:spcPts val="1800"/>
-              </a:spcBef>
+              <a:t>Assumption</a:t>
+            </a:r>
+          </a:p>
+          <a:p>
+            <a:pPr marL="0" indent="0">
               <a:buNone/>
             </a:pPr>
-            <a:r>
-              <a:rPr lang="en-US" sz="2800" dirty="0"/>
-              <a:t>Run time of six fold cross validation took </a:t>
-            </a:r>
-            <a:r>
-              <a:rPr lang="en-US" sz="2800" b="1" dirty="0" smtClean="0"/>
-              <a:t>6.13s</a:t>
-            </a:r>
-            <a:r>
-              <a:rPr lang="en-US" sz="2800" dirty="0" smtClean="0"/>
-              <a:t>. </a:t>
-            </a:r>
-            <a:r>
-              <a:rPr lang="en-US" sz="2800" dirty="0"/>
-              <a:t>As sample size increasing, we expect run time would increase at lease linearly. </a:t>
-            </a:r>
+            <a:endParaRPr lang="en-US" dirty="0"/>
           </a:p>
           <a:p>
             <a:pPr marL="228600" lvl="1" indent="0">
-              <a:spcBef>
-                <a:spcPts val="1800"/>
-              </a:spcBef>
               <a:buNone/>
             </a:pPr>
             <a:r>
               <a:rPr lang="en-US" sz="2800" dirty="0" smtClean="0"/>
-              <a:t>If a new categorical variable with </a:t>
-            </a:r>
-            <a:r>
-              <a:rPr lang="en-US" sz="2800" i="1" dirty="0" smtClean="0"/>
-              <a:t>k</a:t>
+              <a:t>Main assumption of the report, also the assumption of Naïve Bayes classifier, is, </a:t>
+            </a:r>
+            <a:r>
+              <a:rPr lang="en-US" sz="2800" b="1" dirty="0" smtClean="0"/>
+              <a:t>independence between features given class labels</a:t>
             </a:r>
             <a:r>
               <a:rPr lang="en-US" sz="2800" dirty="0" smtClean="0"/>
-              <a:t> levels is added, assume a multinomial distribution, then extra </a:t>
-            </a:r>
-            <a:r>
-              <a:rPr lang="en-US" sz="2800" i="1" dirty="0" smtClean="0"/>
-              <a:t>k-1</a:t>
-            </a:r>
-            <a:r>
-              <a:rPr lang="en-US" sz="2800" dirty="0" smtClean="0"/>
-              <a:t> parameter need to be estimated. </a:t>
+              <a:t>. Although with a strong assumption, Naïve Bayes still have high accuracy in classifying. Its robustness remains an open question.</a:t>
             </a:r>
             <a:endParaRPr lang="en-US" sz="2800" dirty="0"/>
           </a:p>
@@ -8980,7 +9484,7 @@
     </p:spTree>
     <p:extLst>
       <p:ext uri="{BB962C8B-B14F-4D97-AF65-F5344CB8AC3E}">
-        <p14:creationId xmlns:p14="http://schemas.microsoft.com/office/powerpoint/2010/main" xmlns="" val="1164595442"/>
+        <p14:creationId xmlns="" xmlns:p14="http://schemas.microsoft.com/office/powerpoint/2010/main" val="2676136856"/>
       </p:ext>
     </p:extLst>
   </p:cSld>
@@ -9060,37 +9564,72 @@
             </a:pPr>
             <a:r>
               <a:rPr lang="en-US" sz="2800" b="1" dirty="0" smtClean="0"/>
-              <a:t>Obstacles</a:t>
-            </a:r>
-          </a:p>
-          <a:p>
-            <a:pPr marL="0" indent="0">
-              <a:buNone/>
-            </a:pPr>
-            <a:r>
-              <a:rPr lang="en-US" sz="2800" dirty="0" smtClean="0"/>
-              <a:t>Which classification method should we use?</a:t>
-            </a:r>
-          </a:p>
-          <a:p>
-            <a:pPr lvl="1">
+              <a:t>Scaling to Big data</a:t>
+            </a:r>
+          </a:p>
+          <a:p>
+            <a:pPr marL="228600" lvl="1" indent="0">
               <a:spcBef>
                 <a:spcPts val="1800"/>
               </a:spcBef>
-              <a:spcAft>
+              <a:buNone/>
+            </a:pPr>
+            <a:r>
+              <a:rPr lang="en-US" sz="2800" dirty="0"/>
+              <a:t>Run time of six fold cross validation took </a:t>
+            </a:r>
+            <a:r>
+              <a:rPr lang="en-US" sz="2800" b="1" dirty="0" smtClean="0"/>
+              <a:t>6.13s</a:t>
+            </a:r>
+            <a:r>
+              <a:rPr lang="en-US" sz="2800" dirty="0" smtClean="0"/>
+              <a:t>. </a:t>
+            </a:r>
+            <a:r>
+              <a:rPr lang="en-US" sz="2800" dirty="0"/>
+              <a:t>As sample size increasing, we expect run time would increase </a:t>
+            </a:r>
+            <a:r>
+              <a:rPr lang="en-US" sz="2800" dirty="0" smtClean="0"/>
+              <a:t>exponentially.  When changing, our training data set to 1/6 and our test set to 5/6, the cross validation took </a:t>
+            </a:r>
+            <a:r>
+              <a:rPr lang="en-US" sz="2800" b="1" dirty="0" smtClean="0"/>
+              <a:t>42.14s</a:t>
+            </a:r>
+            <a:r>
+              <a:rPr lang="en-US" sz="2800" dirty="0" smtClean="0"/>
+              <a:t>. </a:t>
+            </a:r>
+            <a:endParaRPr lang="en-US" sz="2800" dirty="0"/>
+          </a:p>
+          <a:p>
+            <a:pPr marL="228600" lvl="1" indent="0">
+              <a:spcBef>
                 <a:spcPts val="1800"/>
-              </a:spcAft>
+              </a:spcBef>
+              <a:buNone/>
             </a:pPr>
             <a:r>
               <a:rPr lang="en-US" sz="2800" dirty="0" smtClean="0"/>
-              <a:t>Logistic regression: did not work, because iterative algorithm didn’t converge</a:t>
-            </a:r>
-          </a:p>
-          <a:p>
-            <a:pPr lvl="1"/>
+              <a:t>If a new categorical variable with </a:t>
+            </a:r>
+            <a:r>
+              <a:rPr lang="en-US" sz="2800" i="1" dirty="0" smtClean="0"/>
+              <a:t>k</a:t>
+            </a:r>
             <a:r>
               <a:rPr lang="en-US" sz="2800" dirty="0" smtClean="0"/>
-              <a:t>K-nearest neighbors: did not work, because KNN does not take distance matrix as input, instead, it calculates a Euclidean distance matrix automatically </a:t>
+              <a:t> levels is added, assume a multinomial distribution, then extra </a:t>
+            </a:r>
+            <a:r>
+              <a:rPr lang="en-US" sz="2800" i="1" dirty="0" smtClean="0"/>
+              <a:t>k-1</a:t>
+            </a:r>
+            <a:r>
+              <a:rPr lang="en-US" sz="2800" dirty="0" smtClean="0"/>
+              <a:t> parameter need to be estimated. </a:t>
             </a:r>
             <a:endParaRPr lang="en-US" sz="2800" dirty="0"/>
           </a:p>
@@ -9157,7 +9696,7 @@
     </p:spTree>
     <p:extLst>
       <p:ext uri="{BB962C8B-B14F-4D97-AF65-F5344CB8AC3E}">
-        <p14:creationId xmlns:p14="http://schemas.microsoft.com/office/powerpoint/2010/main" xmlns="" val="1675777127"/>
+        <p14:creationId xmlns="" xmlns:p14="http://schemas.microsoft.com/office/powerpoint/2010/main" val="1164595442"/>
       </p:ext>
     </p:extLst>
   </p:cSld>
@@ -9196,6 +9735,85 @@
       </p:grpSpPr>
       <p:sp>
         <p:nvSpPr>
+          <p:cNvPr id="2" name="Title 1"/>
+          <p:cNvSpPr>
+            <a:spLocks noGrp="1"/>
+          </p:cNvSpPr>
+          <p:nvPr>
+            <p:ph type="title"/>
+          </p:nvPr>
+        </p:nvSpPr>
+        <p:spPr/>
+        <p:txBody>
+          <a:bodyPr/>
+          <a:lstStyle/>
+          <a:p>
+            <a:r>
+              <a:rPr lang="en-US" sz="3200" u="sng" dirty="0"/>
+              <a:t>Discussion</a:t>
+            </a:r>
+            <a:endParaRPr lang="en-US" sz="3200" dirty="0"/>
+          </a:p>
+        </p:txBody>
+      </p:sp>
+      <p:sp>
+        <p:nvSpPr>
+          <p:cNvPr id="3" name="Content Placeholder 2"/>
+          <p:cNvSpPr>
+            <a:spLocks noGrp="1"/>
+          </p:cNvSpPr>
+          <p:nvPr>
+            <p:ph idx="1"/>
+          </p:nvPr>
+        </p:nvSpPr>
+        <p:spPr/>
+        <p:txBody>
+          <a:bodyPr/>
+          <a:lstStyle/>
+          <a:p>
+            <a:pPr marL="0" indent="0">
+              <a:buNone/>
+            </a:pPr>
+            <a:r>
+              <a:rPr lang="en-US" sz="2800" b="1" dirty="0" smtClean="0"/>
+              <a:t>Obstacles</a:t>
+            </a:r>
+          </a:p>
+          <a:p>
+            <a:pPr marL="0" indent="0">
+              <a:buNone/>
+            </a:pPr>
+            <a:r>
+              <a:rPr lang="en-US" sz="2800" dirty="0" smtClean="0"/>
+              <a:t>Which classification method should we use?</a:t>
+            </a:r>
+          </a:p>
+          <a:p>
+            <a:pPr lvl="1">
+              <a:spcBef>
+                <a:spcPts val="1800"/>
+              </a:spcBef>
+              <a:spcAft>
+                <a:spcPts val="1800"/>
+              </a:spcAft>
+            </a:pPr>
+            <a:r>
+              <a:rPr lang="en-US" sz="2800" dirty="0" smtClean="0"/>
+              <a:t>Logistic regression: did not work, because iterative algorithm didn’t converge</a:t>
+            </a:r>
+          </a:p>
+          <a:p>
+            <a:pPr lvl="1"/>
+            <a:r>
+              <a:rPr lang="en-US" sz="2800" dirty="0" smtClean="0"/>
+              <a:t>K-nearest neighbors: did not work, because KNN does not take distance matrix as input, instead, it calculates a Euclidean distance matrix automatically </a:t>
+            </a:r>
+            <a:endParaRPr lang="en-US" sz="2800" dirty="0"/>
+          </a:p>
+        </p:txBody>
+      </p:sp>
+      <p:sp>
+        <p:nvSpPr>
           <p:cNvPr id="4" name="Date Placeholder 3"/>
           <p:cNvSpPr>
             <a:spLocks noGrp="1"/>
@@ -9252,6 +9870,104 @@
           </a:p>
         </p:txBody>
       </p:sp>
+    </p:spTree>
+    <p:extLst>
+      <p:ext uri="{BB962C8B-B14F-4D97-AF65-F5344CB8AC3E}">
+        <p14:creationId xmlns="" xmlns:p14="http://schemas.microsoft.com/office/powerpoint/2010/main" val="1675777127"/>
+      </p:ext>
+    </p:extLst>
+  </p:cSld>
+  <p:clrMapOvr>
+    <a:masterClrMapping/>
+  </p:clrMapOvr>
+  <p:transition>
+    <p:fade/>
+  </p:transition>
+  <p:timing>
+    <p:tnLst>
+      <p:par>
+        <p:cTn id="1" dur="indefinite" restart="never" nodeType="tmRoot"/>
+      </p:par>
+    </p:tnLst>
+  </p:timing>
+</p:sld>
+</file>
+
+<file path=ppt/slides/slide19.xml><?xml version="1.0" encoding="utf-8"?>
+<p:sld xmlns:a="http://schemas.openxmlformats.org/drawingml/2006/main" xmlns:r="http://schemas.openxmlformats.org/officeDocument/2006/relationships" xmlns:p="http://schemas.openxmlformats.org/presentationml/2006/main">
+  <p:cSld>
+    <p:spTree>
+      <p:nvGrpSpPr>
+        <p:cNvPr id="1" name=""/>
+        <p:cNvGrpSpPr/>
+        <p:nvPr/>
+      </p:nvGrpSpPr>
+      <p:grpSpPr>
+        <a:xfrm>
+          <a:off x="0" y="0"/>
+          <a:ext cx="0" cy="0"/>
+          <a:chOff x="0" y="0"/>
+          <a:chExt cx="0" cy="0"/>
+        </a:xfrm>
+      </p:grpSpPr>
+      <p:sp>
+        <p:nvSpPr>
+          <p:cNvPr id="4" name="Date Placeholder 3"/>
+          <p:cNvSpPr>
+            <a:spLocks noGrp="1"/>
+          </p:cNvSpPr>
+          <p:nvPr>
+            <p:ph type="dt" sz="half" idx="10"/>
+          </p:nvPr>
+        </p:nvSpPr>
+        <p:spPr/>
+        <p:txBody>
+          <a:bodyPr/>
+          <a:lstStyle/>
+          <a:p>
+            <a:pPr>
+              <a:defRPr/>
+            </a:pPr>
+            <a:fld id="{CC4FBC14-5DE5-D846-AC24-E7A8D5F1A0B9}" type="datetime4">
+              <a:rPr lang="en-US" smtClean="0"/>
+              <a:pPr>
+                <a:defRPr/>
+              </a:pPr>
+              <a:t>June 3, 2014</a:t>
+            </a:fld>
+            <a:endParaRPr lang="en-US"/>
+          </a:p>
+        </p:txBody>
+      </p:sp>
+      <p:sp>
+        <p:nvSpPr>
+          <p:cNvPr id="5" name="Slide Number Placeholder 4"/>
+          <p:cNvSpPr>
+            <a:spLocks noGrp="1"/>
+          </p:cNvSpPr>
+          <p:nvPr>
+            <p:ph type="sldNum" sz="quarter" idx="11"/>
+          </p:nvPr>
+        </p:nvSpPr>
+        <p:spPr/>
+        <p:txBody>
+          <a:bodyPr/>
+          <a:lstStyle/>
+          <a:p>
+            <a:pPr>
+              <a:defRPr/>
+            </a:pPr>
+            <a:fld id="{E8144B63-FB93-DB4B-B802-147452F8E639}" type="slidenum">
+              <a:rPr lang="en-US" smtClean="0"/>
+              <a:pPr>
+                <a:defRPr/>
+              </a:pPr>
+              <a:t>18</a:t>
+            </a:fld>
+            <a:endParaRPr lang="en-US"/>
+          </a:p>
+        </p:txBody>
+      </p:sp>
       <p:pic>
         <p:nvPicPr>
           <p:cNvPr id="12" name="Content Placeholder 11"/>
@@ -9266,7 +9982,7 @@
           <a:blip r:embed="rId2">
             <a:extLst>
               <a:ext uri="{28A0092B-C50C-407E-A947-70E740481C1C}">
-                <a14:useLocalDpi xmlns:a14="http://schemas.microsoft.com/office/drawing/2010/main" xmlns="" val="0"/>
+                <a14:useLocalDpi xmlns="" xmlns:a14="http://schemas.microsoft.com/office/drawing/2010/main" val="0"/>
               </a:ext>
             </a:extLst>
           </a:blip>
@@ -9284,7 +10000,7 @@
     </p:spTree>
     <p:extLst>
       <p:ext uri="{BB962C8B-B14F-4D97-AF65-F5344CB8AC3E}">
-        <p14:creationId xmlns:p14="http://schemas.microsoft.com/office/powerpoint/2010/main" xmlns="" val="1766743681"/>
+        <p14:creationId xmlns="" xmlns:p14="http://schemas.microsoft.com/office/powerpoint/2010/main" val="1766743681"/>
       </p:ext>
     </p:extLst>
   </p:cSld>
@@ -9464,14 +10180,14 @@
           <a:noFill/>
           <a:extLst>
             <a:ext uri="{909E8E84-426E-40dd-AFC4-6F175D3DCCD1}">
-              <a14:hiddenFill xmlns:a14="http://schemas.microsoft.com/office/drawing/2010/main" xmlns="">
+              <a14:hiddenFill xmlns="" xmlns:a14="http://schemas.microsoft.com/office/drawing/2010/main">
                 <a:solidFill>
                   <a:srgbClr val="FFFFFF"/>
                 </a:solidFill>
               </a14:hiddenFill>
             </a:ext>
             <a:ext uri="{91240B29-F687-4f45-9708-019B960494DF}">
-              <a14:hiddenLine xmlns:a14="http://schemas.microsoft.com/office/drawing/2010/main" xmlns="" w="9525">
+              <a14:hiddenLine xmlns="" xmlns:a14="http://schemas.microsoft.com/office/drawing/2010/main" w="9525">
                 <a:solidFill>
                   <a:srgbClr val="000000"/>
                 </a:solidFill>
@@ -9655,14 +10371,14 @@
           <a:noFill/>
           <a:extLst>
             <a:ext uri="{909E8E84-426E-40dd-AFC4-6F175D3DCCD1}">
-              <a14:hiddenFill xmlns:a14="http://schemas.microsoft.com/office/drawing/2010/main" xmlns="">
+              <a14:hiddenFill xmlns="" xmlns:a14="http://schemas.microsoft.com/office/drawing/2010/main">
                 <a:solidFill>
                   <a:srgbClr val="FFFFFF"/>
                 </a:solidFill>
               </a14:hiddenFill>
             </a:ext>
             <a:ext uri="{91240B29-F687-4f45-9708-019B960494DF}">
-              <a14:hiddenLine xmlns:a14="http://schemas.microsoft.com/office/drawing/2010/main" xmlns="" w="9525">
+              <a14:hiddenLine xmlns="" xmlns:a14="http://schemas.microsoft.com/office/drawing/2010/main" w="9525">
                 <a:solidFill>
                   <a:srgbClr val="000000"/>
                 </a:solidFill>
@@ -10113,7 +10829,7 @@
     </p:spTree>
     <p:extLst>
       <p:ext uri="{BB962C8B-B14F-4D97-AF65-F5344CB8AC3E}">
-        <p14:creationId xmlns:p14="http://schemas.microsoft.com/office/powerpoint/2010/main" xmlns="" val="784172979"/>
+        <p14:creationId xmlns="" xmlns:p14="http://schemas.microsoft.com/office/powerpoint/2010/main" val="784172979"/>
       </p:ext>
     </p:extLst>
   </p:cSld>
@@ -10174,7 +10890,7 @@
         </p:txBody>
       </p:sp>
       <mc:AlternateContent xmlns:mc="http://schemas.openxmlformats.org/markup-compatibility/2006">
-        <mc:Choice xmlns:a14="http://schemas.microsoft.com/office/drawing/2010/main" xmlns="" Requires="a14">
+        <mc:Choice xmlns="" xmlns:a14="http://schemas.microsoft.com/office/drawing/2010/main" Requires="a14">
           <p:sp>
             <p:nvSpPr>
               <p:cNvPr id="3" name="内容占位符 2"/>
@@ -10449,7 +11165,7 @@
     </p:spTree>
     <p:extLst>
       <p:ext uri="{BB962C8B-B14F-4D97-AF65-F5344CB8AC3E}">
-        <p14:creationId xmlns:p14="http://schemas.microsoft.com/office/powerpoint/2010/main" xmlns="" val="676677402"/>
+        <p14:creationId xmlns="" xmlns:p14="http://schemas.microsoft.com/office/powerpoint/2010/main" val="676677402"/>
       </p:ext>
     </p:extLst>
   </p:cSld>
@@ -10510,7 +11226,7 @@
         </p:txBody>
       </p:sp>
       <mc:AlternateContent xmlns:mc="http://schemas.openxmlformats.org/markup-compatibility/2006">
-        <mc:Choice xmlns:a14="http://schemas.microsoft.com/office/drawing/2010/main" xmlns="" Requires="a14">
+        <mc:Choice xmlns="" xmlns:a14="http://schemas.microsoft.com/office/drawing/2010/main" Requires="a14">
           <p:sp>
             <p:nvSpPr>
               <p:cNvPr id="3" name="内容占位符 2"/>
@@ -11076,7 +11792,7 @@
     </p:spTree>
     <p:extLst>
       <p:ext uri="{BB962C8B-B14F-4D97-AF65-F5344CB8AC3E}">
-        <p14:creationId xmlns:p14="http://schemas.microsoft.com/office/powerpoint/2010/main" xmlns="" val="1814670226"/>
+        <p14:creationId xmlns="" xmlns:p14="http://schemas.microsoft.com/office/powerpoint/2010/main" val="1814670226"/>
       </p:ext>
     </p:extLst>
   </p:cSld>
@@ -11267,7 +11983,7 @@
     </p:spTree>
     <p:extLst>
       <p:ext uri="{BB962C8B-B14F-4D97-AF65-F5344CB8AC3E}">
-        <p14:creationId xmlns:p14="http://schemas.microsoft.com/office/powerpoint/2010/main" xmlns="" val="3523709704"/>
+        <p14:creationId xmlns="" xmlns:p14="http://schemas.microsoft.com/office/powerpoint/2010/main" val="3523709704"/>
       </p:ext>
     </p:extLst>
   </p:cSld>
@@ -11459,7 +12175,7 @@
     </p:spTree>
     <p:extLst>
       <p:ext uri="{BB962C8B-B14F-4D97-AF65-F5344CB8AC3E}">
-        <p14:creationId xmlns:p14="http://schemas.microsoft.com/office/powerpoint/2010/main" xmlns="" val="3723105540"/>
+        <p14:creationId xmlns="" xmlns:p14="http://schemas.microsoft.com/office/powerpoint/2010/main" val="3723105540"/>
       </p:ext>
     </p:extLst>
   </p:cSld>
@@ -11731,7 +12447,7 @@
     </p:spTree>
     <p:extLst>
       <p:ext uri="{BB962C8B-B14F-4D97-AF65-F5344CB8AC3E}">
-        <p14:creationId xmlns:p14="http://schemas.microsoft.com/office/powerpoint/2010/main" xmlns="" val="1256611496"/>
+        <p14:creationId xmlns="" xmlns:p14="http://schemas.microsoft.com/office/powerpoint/2010/main" val="1256611496"/>
       </p:ext>
     </p:extLst>
   </p:cSld>
@@ -11972,7 +12688,7 @@
     </p:spTree>
     <p:extLst>
       <p:ext uri="{BB962C8B-B14F-4D97-AF65-F5344CB8AC3E}">
-        <p14:creationId xmlns:p14="http://schemas.microsoft.com/office/powerpoint/2010/main" xmlns="" val="1886790651"/>
+        <p14:creationId xmlns="" xmlns:p14="http://schemas.microsoft.com/office/powerpoint/2010/main" val="1886790651"/>
       </p:ext>
     </p:extLst>
   </p:cSld>

</xml_diff>

<commit_message>
Final Look Over and Saving as PDF.
</commit_message>
<xml_diff>
--- a/Presentation/presentation-draft.pptx
+++ b/Presentation/presentation-draft.pptx
@@ -160,7 +160,7 @@
   </p:defaultTextStyle>
   <p:extLst>
     <p:ext uri="{EFAFB233-063F-42B5-8137-9DF3F51BA10A}">
-      <p15:sldGuideLst xmlns="" xmlns:p15="http://schemas.microsoft.com/office/powerpoint/2012/main">
+      <p15:sldGuideLst xmlns:p15="http://schemas.microsoft.com/office/powerpoint/2012/main" xmlns="">
         <p15:guide id="1" orient="horz" pos="2160">
           <p15:clr>
             <a:srgbClr val="A4A3A4"/>
@@ -378,7 +378,7 @@
     </p:spTree>
     <p:extLst>
       <p:ext uri="{BB962C8B-B14F-4D97-AF65-F5344CB8AC3E}">
-        <p14:creationId xmlns:p14="http://schemas.microsoft.com/office/powerpoint/2010/main" xmlns="" val="3904371776"/>
+        <p14:creationId xmlns="" xmlns:p14="http://schemas.microsoft.com/office/powerpoint/2010/main" val="3904371776"/>
       </p:ext>
     </p:extLst>
   </p:cSld>
@@ -688,7 +688,7 @@
     </p:spTree>
     <p:extLst>
       <p:ext uri="{BB962C8B-B14F-4D97-AF65-F5344CB8AC3E}">
-        <p14:creationId xmlns:p14="http://schemas.microsoft.com/office/powerpoint/2010/main" xmlns="" val="2384980960"/>
+        <p14:creationId xmlns="" xmlns:p14="http://schemas.microsoft.com/office/powerpoint/2010/main" val="2384980960"/>
       </p:ext>
     </p:extLst>
   </p:cSld>
@@ -1440,7 +1440,7 @@
           </a:ln>
           <a:extLst>
             <a:ext uri="{91240B29-F687-4f45-9708-019B960494DF}">
-              <a14:hiddenLine xmlns:a14="http://schemas.microsoft.com/office/drawing/2010/main" xmlns="" w="9525">
+              <a14:hiddenLine xmlns="" xmlns:a14="http://schemas.microsoft.com/office/drawing/2010/main" w="9525">
                 <a:solidFill>
                   <a:srgbClr val="000000"/>
                 </a:solidFill>
@@ -1489,7 +1489,7 @@
           </a:ln>
           <a:extLst>
             <a:ext uri="{91240B29-F687-4f45-9708-019B960494DF}">
-              <a14:hiddenLine xmlns:a14="http://schemas.microsoft.com/office/drawing/2010/main" xmlns="" w="9525">
+              <a14:hiddenLine xmlns="" xmlns:a14="http://schemas.microsoft.com/office/drawing/2010/main" w="9525">
                 <a:solidFill>
                   <a:srgbClr val="000000"/>
                 </a:solidFill>
@@ -1526,7 +1526,7 @@
           <a:blip r:embed="rId2">
             <a:extLst>
               <a:ext uri="{28A0092B-C50C-407E-A947-70E740481C1C}">
-                <a14:useLocalDpi xmlns:a14="http://schemas.microsoft.com/office/drawing/2010/main" xmlns="" val="0"/>
+                <a14:useLocalDpi xmlns="" xmlns:a14="http://schemas.microsoft.com/office/drawing/2010/main" val="0"/>
               </a:ext>
             </a:extLst>
           </a:blip>
@@ -1549,14 +1549,14 @@
           </a:ln>
           <a:extLst>
             <a:ext uri="{909E8E84-426E-40dd-AFC4-6F175D3DCCD1}">
-              <a14:hiddenFill xmlns:a14="http://schemas.microsoft.com/office/drawing/2010/main" xmlns="">
+              <a14:hiddenFill xmlns="" xmlns:a14="http://schemas.microsoft.com/office/drawing/2010/main">
                 <a:solidFill>
                   <a:srgbClr val="FFFFFF"/>
                 </a:solidFill>
               </a14:hiddenFill>
             </a:ext>
             <a:ext uri="{91240B29-F687-4f45-9708-019B960494DF}">
-              <a14:hiddenLine xmlns:a14="http://schemas.microsoft.com/office/drawing/2010/main" xmlns="" w="9525">
+              <a14:hiddenLine xmlns="" xmlns:a14="http://schemas.microsoft.com/office/drawing/2010/main" w="9525">
                 <a:solidFill>
                   <a:srgbClr val="000000"/>
                 </a:solidFill>
@@ -1646,7 +1646,7 @@
     </p:spTree>
     <p:extLst>
       <p:ext uri="{BB962C8B-B14F-4D97-AF65-F5344CB8AC3E}">
-        <p14:creationId xmlns:p14="http://schemas.microsoft.com/office/powerpoint/2010/main" xmlns="" val="4106179330"/>
+        <p14:creationId xmlns="" xmlns:p14="http://schemas.microsoft.com/office/powerpoint/2010/main" val="4106179330"/>
       </p:ext>
     </p:extLst>
   </p:cSld>
@@ -1906,7 +1906,7 @@
     </p:spTree>
     <p:extLst>
       <p:ext uri="{BB962C8B-B14F-4D97-AF65-F5344CB8AC3E}">
-        <p14:creationId xmlns:p14="http://schemas.microsoft.com/office/powerpoint/2010/main" xmlns="" val="2330010810"/>
+        <p14:creationId xmlns="" xmlns:p14="http://schemas.microsoft.com/office/powerpoint/2010/main" val="2330010810"/>
       </p:ext>
     </p:extLst>
   </p:cSld>
@@ -2201,7 +2201,7 @@
     </p:spTree>
     <p:extLst>
       <p:ext uri="{BB962C8B-B14F-4D97-AF65-F5344CB8AC3E}">
-        <p14:creationId xmlns:p14="http://schemas.microsoft.com/office/powerpoint/2010/main" xmlns="" val="614527096"/>
+        <p14:creationId xmlns="" xmlns:p14="http://schemas.microsoft.com/office/powerpoint/2010/main" val="614527096"/>
       </p:ext>
     </p:extLst>
   </p:cSld>
@@ -2492,7 +2492,7 @@
     </p:spTree>
     <p:extLst>
       <p:ext uri="{BB962C8B-B14F-4D97-AF65-F5344CB8AC3E}">
-        <p14:creationId xmlns:p14="http://schemas.microsoft.com/office/powerpoint/2010/main" xmlns="" val="2270394588"/>
+        <p14:creationId xmlns="" xmlns:p14="http://schemas.microsoft.com/office/powerpoint/2010/main" val="2270394588"/>
       </p:ext>
     </p:extLst>
   </p:cSld>
@@ -2808,7 +2808,7 @@
     </p:spTree>
     <p:extLst>
       <p:ext uri="{BB962C8B-B14F-4D97-AF65-F5344CB8AC3E}">
-        <p14:creationId xmlns:p14="http://schemas.microsoft.com/office/powerpoint/2010/main" xmlns="" val="4155116445"/>
+        <p14:creationId xmlns="" xmlns:p14="http://schemas.microsoft.com/office/powerpoint/2010/main" val="4155116445"/>
       </p:ext>
     </p:extLst>
   </p:cSld>
@@ -3124,7 +3124,7 @@
     </p:spTree>
     <p:extLst>
       <p:ext uri="{BB962C8B-B14F-4D97-AF65-F5344CB8AC3E}">
-        <p14:creationId xmlns:p14="http://schemas.microsoft.com/office/powerpoint/2010/main" xmlns="" val="3368182647"/>
+        <p14:creationId xmlns="" xmlns:p14="http://schemas.microsoft.com/office/powerpoint/2010/main" val="3368182647"/>
       </p:ext>
     </p:extLst>
   </p:cSld>
@@ -3432,7 +3432,7 @@
     </p:spTree>
     <p:extLst>
       <p:ext uri="{BB962C8B-B14F-4D97-AF65-F5344CB8AC3E}">
-        <p14:creationId xmlns:p14="http://schemas.microsoft.com/office/powerpoint/2010/main" xmlns="" val="985965977"/>
+        <p14:creationId xmlns="" xmlns:p14="http://schemas.microsoft.com/office/powerpoint/2010/main" val="985965977"/>
       </p:ext>
     </p:extLst>
   </p:cSld>
@@ -3554,7 +3554,7 @@
     </p:spTree>
     <p:extLst>
       <p:ext uri="{BB962C8B-B14F-4D97-AF65-F5344CB8AC3E}">
-        <p14:creationId xmlns:p14="http://schemas.microsoft.com/office/powerpoint/2010/main" xmlns="" val="4294105242"/>
+        <p14:creationId xmlns="" xmlns:p14="http://schemas.microsoft.com/office/powerpoint/2010/main" val="4294105242"/>
       </p:ext>
     </p:extLst>
   </p:cSld>
@@ -3688,7 +3688,7 @@
     </p:spTree>
     <p:extLst>
       <p:ext uri="{BB962C8B-B14F-4D97-AF65-F5344CB8AC3E}">
-        <p14:creationId xmlns:p14="http://schemas.microsoft.com/office/powerpoint/2010/main" xmlns="" val="2818520777"/>
+        <p14:creationId xmlns="" xmlns:p14="http://schemas.microsoft.com/office/powerpoint/2010/main" val="2818520777"/>
       </p:ext>
     </p:extLst>
   </p:cSld>
@@ -3914,7 +3914,7 @@
     </p:spTree>
     <p:extLst>
       <p:ext uri="{BB962C8B-B14F-4D97-AF65-F5344CB8AC3E}">
-        <p14:creationId xmlns:p14="http://schemas.microsoft.com/office/powerpoint/2010/main" xmlns="" val="1022151706"/>
+        <p14:creationId xmlns="" xmlns:p14="http://schemas.microsoft.com/office/powerpoint/2010/main" val="1022151706"/>
       </p:ext>
     </p:extLst>
   </p:cSld>
@@ -4178,7 +4178,7 @@
     </p:spTree>
     <p:extLst>
       <p:ext uri="{BB962C8B-B14F-4D97-AF65-F5344CB8AC3E}">
-        <p14:creationId xmlns:p14="http://schemas.microsoft.com/office/powerpoint/2010/main" xmlns="" val="2785841850"/>
+        <p14:creationId xmlns="" xmlns:p14="http://schemas.microsoft.com/office/powerpoint/2010/main" val="2785841850"/>
       </p:ext>
     </p:extLst>
   </p:cSld>
@@ -4473,7 +4473,7 @@
     </p:spTree>
     <p:extLst>
       <p:ext uri="{BB962C8B-B14F-4D97-AF65-F5344CB8AC3E}">
-        <p14:creationId xmlns:p14="http://schemas.microsoft.com/office/powerpoint/2010/main" xmlns="" val="178877595"/>
+        <p14:creationId xmlns="" xmlns:p14="http://schemas.microsoft.com/office/powerpoint/2010/main" val="178877595"/>
       </p:ext>
     </p:extLst>
   </p:cSld>
@@ -4659,7 +4659,7 @@
     </p:spTree>
     <p:extLst>
       <p:ext uri="{BB962C8B-B14F-4D97-AF65-F5344CB8AC3E}">
-        <p14:creationId xmlns:p14="http://schemas.microsoft.com/office/powerpoint/2010/main" xmlns="" val="1991616225"/>
+        <p14:creationId xmlns="" xmlns:p14="http://schemas.microsoft.com/office/powerpoint/2010/main" val="1991616225"/>
       </p:ext>
     </p:extLst>
   </p:cSld>
@@ -4809,7 +4809,7 @@
     </p:spTree>
     <p:extLst>
       <p:ext uri="{BB962C8B-B14F-4D97-AF65-F5344CB8AC3E}">
-        <p14:creationId xmlns:p14="http://schemas.microsoft.com/office/powerpoint/2010/main" xmlns="" val="3811359751"/>
+        <p14:creationId xmlns="" xmlns:p14="http://schemas.microsoft.com/office/powerpoint/2010/main" val="3811359751"/>
       </p:ext>
     </p:extLst>
   </p:cSld>
@@ -5040,7 +5040,7 @@
     </p:spTree>
     <p:extLst>
       <p:ext uri="{BB962C8B-B14F-4D97-AF65-F5344CB8AC3E}">
-        <p14:creationId xmlns:p14="http://schemas.microsoft.com/office/powerpoint/2010/main" xmlns="" val="3100148321"/>
+        <p14:creationId xmlns="" xmlns:p14="http://schemas.microsoft.com/office/powerpoint/2010/main" val="3100148321"/>
       </p:ext>
     </p:extLst>
   </p:cSld>
@@ -5269,7 +5269,7 @@
     </p:spTree>
     <p:extLst>
       <p:ext uri="{BB962C8B-B14F-4D97-AF65-F5344CB8AC3E}">
-        <p14:creationId xmlns:p14="http://schemas.microsoft.com/office/powerpoint/2010/main" xmlns="" val="183857643"/>
+        <p14:creationId xmlns="" xmlns:p14="http://schemas.microsoft.com/office/powerpoint/2010/main" val="183857643"/>
       </p:ext>
     </p:extLst>
   </p:cSld>
@@ -5533,7 +5533,7 @@
     </p:spTree>
     <p:extLst>
       <p:ext uri="{BB962C8B-B14F-4D97-AF65-F5344CB8AC3E}">
-        <p14:creationId xmlns:p14="http://schemas.microsoft.com/office/powerpoint/2010/main" xmlns="" val="459280236"/>
+        <p14:creationId xmlns="" xmlns:p14="http://schemas.microsoft.com/office/powerpoint/2010/main" val="459280236"/>
       </p:ext>
     </p:extLst>
   </p:cSld>
@@ -5595,7 +5595,7 @@
           </a:ln>
           <a:extLst>
             <a:ext uri="{91240B29-F687-4f45-9708-019B960494DF}">
-              <a14:hiddenLine xmlns:a14="http://schemas.microsoft.com/office/drawing/2010/main" xmlns="" w="9525">
+              <a14:hiddenLine xmlns="" xmlns:a14="http://schemas.microsoft.com/office/drawing/2010/main" w="9525">
                 <a:solidFill>
                   <a:srgbClr val="000000"/>
                 </a:solidFill>
@@ -5632,7 +5632,7 @@
           <a:blip r:embed="rId19">
             <a:extLst>
               <a:ext uri="{28A0092B-C50C-407E-A947-70E740481C1C}">
-                <a14:useLocalDpi xmlns:a14="http://schemas.microsoft.com/office/drawing/2010/main" xmlns="" val="0"/>
+                <a14:useLocalDpi xmlns="" xmlns:a14="http://schemas.microsoft.com/office/drawing/2010/main" val="0"/>
               </a:ext>
             </a:extLst>
           </a:blip>
@@ -5655,14 +5655,14 @@
           </a:ln>
           <a:extLst>
             <a:ext uri="{909E8E84-426E-40dd-AFC4-6F175D3DCCD1}">
-              <a14:hiddenFill xmlns:a14="http://schemas.microsoft.com/office/drawing/2010/main" xmlns="">
+              <a14:hiddenFill xmlns="" xmlns:a14="http://schemas.microsoft.com/office/drawing/2010/main">
                 <a:solidFill>
                   <a:srgbClr val="FFFFFF"/>
                 </a:solidFill>
               </a14:hiddenFill>
             </a:ext>
             <a:ext uri="{91240B29-F687-4f45-9708-019B960494DF}">
-              <a14:hiddenLine xmlns:a14="http://schemas.microsoft.com/office/drawing/2010/main" xmlns="" w="9525">
+              <a14:hiddenLine xmlns="" xmlns:a14="http://schemas.microsoft.com/office/drawing/2010/main" w="9525">
                 <a:solidFill>
                   <a:srgbClr val="000000"/>
                 </a:solidFill>
@@ -5698,14 +5698,14 @@
           </a:ln>
           <a:extLst>
             <a:ext uri="{909E8E84-426E-40dd-AFC4-6F175D3DCCD1}">
-              <a14:hiddenFill xmlns:a14="http://schemas.microsoft.com/office/drawing/2010/main" xmlns="">
+              <a14:hiddenFill xmlns="" xmlns:a14="http://schemas.microsoft.com/office/drawing/2010/main">
                 <a:solidFill>
                   <a:srgbClr val="FFFFFF"/>
                 </a:solidFill>
               </a14:hiddenFill>
             </a:ext>
             <a:ext uri="{91240B29-F687-4f45-9708-019B960494DF}">
-              <a14:hiddenLine xmlns:a14="http://schemas.microsoft.com/office/drawing/2010/main" xmlns="" w="9525">
+              <a14:hiddenLine xmlns="" xmlns:a14="http://schemas.microsoft.com/office/drawing/2010/main" w="9525">
                 <a:solidFill>
                   <a:srgbClr val="000000"/>
                 </a:solidFill>
@@ -5715,7 +5715,7 @@
               </a14:hiddenLine>
             </a:ext>
             <a:ext uri="{FAA26D3D-D897-4be2-8F04-BA451C77F1D7}">
-              <ma14:placeholderFlag xmlns:ma14="http://schemas.microsoft.com/office/mac/drawingml/2011/main" xmlns="" val="1"/>
+              <ma14:placeholderFlag xmlns="" xmlns:ma14="http://schemas.microsoft.com/office/mac/drawingml/2011/main" val="1"/>
             </a:ext>
           </a:extLst>
         </p:spPr>
@@ -5760,14 +5760,14 @@
           </a:ln>
           <a:extLst>
             <a:ext uri="{909E8E84-426E-40dd-AFC4-6F175D3DCCD1}">
-              <a14:hiddenFill xmlns:a14="http://schemas.microsoft.com/office/drawing/2010/main" xmlns="">
+              <a14:hiddenFill xmlns="" xmlns:a14="http://schemas.microsoft.com/office/drawing/2010/main">
                 <a:solidFill>
                   <a:srgbClr val="FFFFFF"/>
                 </a:solidFill>
               </a14:hiddenFill>
             </a:ext>
             <a:ext uri="{91240B29-F687-4f45-9708-019B960494DF}">
-              <a14:hiddenLine xmlns:a14="http://schemas.microsoft.com/office/drawing/2010/main" xmlns="" w="9525">
+              <a14:hiddenLine xmlns="" xmlns:a14="http://schemas.microsoft.com/office/drawing/2010/main" w="9525">
                 <a:solidFill>
                   <a:srgbClr val="000000"/>
                 </a:solidFill>
@@ -5777,7 +5777,7 @@
               </a14:hiddenLine>
             </a:ext>
             <a:ext uri="{FAA26D3D-D897-4be2-8F04-BA451C77F1D7}">
-              <ma14:placeholderFlag xmlns:ma14="http://schemas.microsoft.com/office/mac/drawingml/2011/main" xmlns="" val="1"/>
+              <ma14:placeholderFlag xmlns="" xmlns:ma14="http://schemas.microsoft.com/office/mac/drawingml/2011/main" val="1"/>
             </a:ext>
           </a:extLst>
         </p:spPr>
@@ -6545,7 +6545,7 @@
             <a:alphaModFix amt="81000"/>
             <a:extLst>
               <a:ext uri="{28A0092B-C50C-407E-A947-70E740481C1C}">
-                <a14:useLocalDpi xmlns:a14="http://schemas.microsoft.com/office/drawing/2010/main" xmlns="" val="0"/>
+                <a14:useLocalDpi xmlns="" xmlns:a14="http://schemas.microsoft.com/office/drawing/2010/main" val="0"/>
               </a:ext>
             </a:extLst>
           </a:blip>
@@ -6694,15 +6694,7 @@
             </a:pPr>
             <a:r>
               <a:rPr lang="en-US" sz="2800" dirty="0" smtClean="0"/>
-              <a:t>ROC graph depicts relative tradeoffs between benefits (TP) and costs (FP). The more </a:t>
-            </a:r>
-            <a:r>
-              <a:rPr lang="en-US" sz="2800" dirty="0" smtClean="0"/>
-              <a:t>top-left a </a:t>
-            </a:r>
-            <a:r>
-              <a:rPr lang="en-US" sz="2800" dirty="0" smtClean="0"/>
-              <a:t>point lies, the better the corresponding classifier performance. </a:t>
+              <a:t>ROC graph depicts relative tradeoffs between benefits (TP) and costs (FP). The more top-left a point lies, the better the corresponding classifier performance. </a:t>
             </a:r>
           </a:p>
           <a:p>
@@ -6806,7 +6798,7 @@
     </p:spTree>
     <p:extLst>
       <p:ext uri="{BB962C8B-B14F-4D97-AF65-F5344CB8AC3E}">
-        <p14:creationId xmlns:p14="http://schemas.microsoft.com/office/powerpoint/2010/main" xmlns="" val="610192193"/>
+        <p14:creationId xmlns="" xmlns:p14="http://schemas.microsoft.com/office/powerpoint/2010/main" val="610192193"/>
       </p:ext>
     </p:extLst>
   </p:cSld>
@@ -6961,7 +6953,7 @@
     </p:spTree>
     <p:extLst>
       <p:ext uri="{BB962C8B-B14F-4D97-AF65-F5344CB8AC3E}">
-        <p14:creationId xmlns:p14="http://schemas.microsoft.com/office/powerpoint/2010/main" xmlns="" val="3682975160"/>
+        <p14:creationId xmlns="" xmlns:p14="http://schemas.microsoft.com/office/powerpoint/2010/main" val="3682975160"/>
       </p:ext>
     </p:extLst>
   </p:cSld>
@@ -7035,7 +7027,7 @@
           <a:blip r:embed="rId3">
             <a:extLst>
               <a:ext uri="{28A0092B-C50C-407E-A947-70E740481C1C}">
-                <a14:useLocalDpi xmlns:a14="http://schemas.microsoft.com/office/drawing/2010/main" xmlns="" val="0"/>
+                <a14:useLocalDpi xmlns="" xmlns:a14="http://schemas.microsoft.com/office/drawing/2010/main" val="0"/>
               </a:ext>
             </a:extLst>
           </a:blip>
@@ -7111,7 +7103,7 @@
     </p:spTree>
     <p:extLst>
       <p:ext uri="{BB962C8B-B14F-4D97-AF65-F5344CB8AC3E}">
-        <p14:creationId xmlns:p14="http://schemas.microsoft.com/office/powerpoint/2010/main" xmlns="" val="2176588019"/>
+        <p14:creationId xmlns="" xmlns:p14="http://schemas.microsoft.com/office/powerpoint/2010/main" val="2176588019"/>
       </p:ext>
     </p:extLst>
   </p:cSld>
@@ -7183,7 +7175,7 @@
         </p:nvGraphicFramePr>
         <p:xfrm>
           <a:off x="900560" y="2049538"/>
-          <a:ext cx="7331724" cy="3587094"/>
+          <a:ext cx="7331724" cy="3438183"/>
         </p:xfrm>
         <a:graphic>
           <a:graphicData uri="http://schemas.openxmlformats.org/drawingml/2006/table">
@@ -7913,7 +7905,7 @@
             <p:ph idx="1"/>
             <p:extLst>
               <p:ext uri="{D42A27DB-BD31-4B8C-83A1-F6EECF244321}">
-                <p14:modId xmlns:p14="http://schemas.microsoft.com/office/powerpoint/2010/main" xmlns="" val="1342030354"/>
+                <p14:modId xmlns="" xmlns:p14="http://schemas.microsoft.com/office/powerpoint/2010/main" val="1342030354"/>
               </p:ext>
             </p:extLst>
           </p:nvPr>
@@ -9798,7 +9790,7 @@
     </p:spTree>
     <p:extLst>
       <p:ext uri="{BB962C8B-B14F-4D97-AF65-F5344CB8AC3E}">
-        <p14:creationId xmlns:p14="http://schemas.microsoft.com/office/powerpoint/2010/main" xmlns="" val="3598000523"/>
+        <p14:creationId xmlns="" xmlns:p14="http://schemas.microsoft.com/office/powerpoint/2010/main" val="3598000523"/>
       </p:ext>
     </p:extLst>
   </p:cSld>
@@ -9968,11 +9960,7 @@
             </a:r>
             <a:r>
               <a:rPr lang="en-US" altLang="zh-CN" sz="2800" dirty="0" smtClean="0"/>
-              <a:t> misclassifies 7.98% of </a:t>
-            </a:r>
-            <a:r>
-              <a:rPr lang="en-US" altLang="zh-CN" sz="2800" dirty="0" smtClean="0"/>
-              <a:t>mushrooms</a:t>
+              <a:t> misclassifies 7.98% of mushrooms</a:t>
             </a:r>
           </a:p>
           <a:p>
@@ -10001,7 +9989,7 @@
     </p:spTree>
     <p:extLst>
       <p:ext uri="{BB962C8B-B14F-4D97-AF65-F5344CB8AC3E}">
-        <p14:creationId xmlns:p14="http://schemas.microsoft.com/office/powerpoint/2010/main" xmlns="" val="1662710540"/>
+        <p14:creationId xmlns="" xmlns:p14="http://schemas.microsoft.com/office/powerpoint/2010/main" val="1662710540"/>
       </p:ext>
     </p:extLst>
   </p:cSld>
@@ -10091,19 +10079,7 @@
             </a:pPr>
             <a:r>
               <a:rPr lang="en-US" altLang="zh-CN" sz="2800" dirty="0" smtClean="0"/>
-              <a:t> </a:t>
-            </a:r>
-            <a:r>
-              <a:rPr lang="en-US" altLang="zh-CN" sz="2800" dirty="0" smtClean="0"/>
-              <a:t>Independence </a:t>
-            </a:r>
-            <a:r>
-              <a:rPr lang="en-US" altLang="zh-CN" sz="2800" dirty="0" smtClean="0"/>
-              <a:t>between features given class </a:t>
-            </a:r>
-            <a:r>
-              <a:rPr lang="en-US" altLang="zh-CN" sz="2800" dirty="0" smtClean="0"/>
-              <a:t>labels</a:t>
+              <a:t> Independence between features given class labels</a:t>
             </a:r>
           </a:p>
           <a:p>
@@ -10123,11 +10099,7 @@
             </a:pPr>
             <a:r>
               <a:rPr lang="en-US" sz="2800" dirty="0" smtClean="0"/>
-              <a:t> </a:t>
-            </a:r>
-            <a:r>
-              <a:rPr lang="en-US" sz="2800" dirty="0" smtClean="0"/>
-              <a:t>Naïve </a:t>
+              <a:t> Naïve </a:t>
             </a:r>
             <a:r>
               <a:rPr lang="en-US" sz="2800" dirty="0" err="1" smtClean="0"/>
@@ -10147,7 +10119,6 @@
               <a:rPr lang="en-US" sz="2800" dirty="0" smtClean="0"/>
               <a:t> Reason behind robustness is an open question</a:t>
             </a:r>
-            <a:endParaRPr lang="en-US" sz="2800" dirty="0" smtClean="0"/>
           </a:p>
           <a:p>
             <a:pPr marL="0" indent="0">
@@ -10218,7 +10189,7 @@
     </p:spTree>
     <p:extLst>
       <p:ext uri="{BB962C8B-B14F-4D97-AF65-F5344CB8AC3E}">
-        <p14:creationId xmlns:p14="http://schemas.microsoft.com/office/powerpoint/2010/main" xmlns="" val="2676136856"/>
+        <p14:creationId xmlns="" xmlns:p14="http://schemas.microsoft.com/office/powerpoint/2010/main" val="2676136856"/>
       </p:ext>
     </p:extLst>
   </p:cSld>
@@ -10298,11 +10269,7 @@
             </a:pPr>
             <a:r>
               <a:rPr lang="en-US" sz="2800" b="1" dirty="0" smtClean="0"/>
-              <a:t>Scaling to Big </a:t>
-            </a:r>
-            <a:r>
-              <a:rPr lang="en-US" sz="2800" b="1" dirty="0" smtClean="0"/>
-              <a:t>data</a:t>
+              <a:t>Scaling to Big data</a:t>
             </a:r>
           </a:p>
           <a:p>
@@ -10312,11 +10279,7 @@
             </a:pPr>
             <a:r>
               <a:rPr lang="en-US" altLang="zh-CN" sz="2800" dirty="0" smtClean="0"/>
-              <a:t>Run time of </a:t>
-            </a:r>
-            <a:r>
-              <a:rPr lang="en-US" altLang="zh-CN" sz="2800" dirty="0" smtClean="0"/>
-              <a:t>6-fold CV: </a:t>
+              <a:t>Run time of 6-fold CV: </a:t>
             </a:r>
             <a:r>
               <a:rPr lang="en-US" altLang="zh-CN" sz="2800" b="1" dirty="0" smtClean="0"/>
@@ -10330,23 +10293,7 @@
             </a:pPr>
             <a:r>
               <a:rPr lang="en-US" altLang="zh-CN" sz="2800" dirty="0" smtClean="0"/>
-              <a:t>Expect </a:t>
-            </a:r>
-            <a:r>
-              <a:rPr lang="en-US" altLang="zh-CN" sz="2800" dirty="0" smtClean="0"/>
-              <a:t>run time </a:t>
-            </a:r>
-            <a:r>
-              <a:rPr lang="en-US" altLang="zh-CN" sz="2800" dirty="0" smtClean="0"/>
-              <a:t>to </a:t>
-            </a:r>
-            <a:r>
-              <a:rPr lang="en-US" altLang="zh-CN" sz="2800" dirty="0" smtClean="0"/>
-              <a:t>increase </a:t>
-            </a:r>
-            <a:r>
-              <a:rPr lang="en-US" altLang="zh-CN" sz="2800" dirty="0" smtClean="0"/>
-              <a:t>with size of test set</a:t>
+              <a:t>Expect run time to increase with size of test set</a:t>
             </a:r>
           </a:p>
           <a:p>
@@ -10356,15 +10303,7 @@
             </a:pPr>
             <a:r>
               <a:rPr lang="en-US" altLang="zh-CN" sz="2800" dirty="0" smtClean="0"/>
-              <a:t>1/6 training </a:t>
-            </a:r>
-            <a:r>
-              <a:rPr lang="en-US" altLang="zh-CN" sz="2800" dirty="0" smtClean="0"/>
-              <a:t>and </a:t>
-            </a:r>
-            <a:r>
-              <a:rPr lang="en-US" altLang="zh-CN" sz="2800" dirty="0" smtClean="0"/>
-              <a:t>5/6 testing : </a:t>
+              <a:t>1/6 training and 5/6 testing : </a:t>
             </a:r>
             <a:r>
               <a:rPr lang="en-US" altLang="zh-CN" sz="2800" b="1" dirty="0" smtClean="0"/>
@@ -10379,11 +10318,7 @@
             </a:pPr>
             <a:r>
               <a:rPr lang="en-US" altLang="zh-CN" sz="2800" dirty="0" smtClean="0"/>
-              <a:t>Expect run time to increase with </a:t>
-            </a:r>
-            <a:r>
-              <a:rPr lang="en-US" altLang="zh-CN" sz="2800" dirty="0" smtClean="0"/>
-              <a:t># of features</a:t>
+              <a:t>Expect run time to increase with # of features</a:t>
             </a:r>
           </a:p>
           <a:p>
@@ -10421,7 +10356,6 @@
               <a:rPr lang="en-US" altLang="zh-CN" sz="2400" dirty="0" smtClean="0"/>
               <a:t> parameters to estimate</a:t>
             </a:r>
-            <a:endParaRPr lang="en-US" altLang="zh-CN" sz="2400" dirty="0" smtClean="0"/>
           </a:p>
         </p:txBody>
       </p:sp>
@@ -10486,7 +10420,7 @@
     </p:spTree>
     <p:extLst>
       <p:ext uri="{BB962C8B-B14F-4D97-AF65-F5344CB8AC3E}">
-        <p14:creationId xmlns:p14="http://schemas.microsoft.com/office/powerpoint/2010/main" xmlns="" val="1164595442"/>
+        <p14:creationId xmlns="" xmlns:p14="http://schemas.microsoft.com/office/powerpoint/2010/main" val="1164595442"/>
       </p:ext>
     </p:extLst>
   </p:cSld>
@@ -10604,26 +10538,14 @@
             </a:r>
             <a:r>
               <a:rPr lang="en-US" sz="2800" dirty="0" smtClean="0"/>
-              <a:t> </a:t>
-            </a:r>
-            <a:r>
-              <a:rPr lang="en-US" sz="2800" dirty="0" smtClean="0"/>
-              <a:t>does not take distance matrix as input, instead, it calculates a Euclidean distance matrix </a:t>
-            </a:r>
-            <a:r>
-              <a:rPr lang="en-US" sz="2800" dirty="0" smtClean="0"/>
-              <a:t>automatically</a:t>
+              <a:t> does not take distance matrix as input, instead, it calculates a Euclidean distance matrix automatically</a:t>
             </a:r>
           </a:p>
           <a:p>
             <a:pPr lvl="2"/>
             <a:r>
               <a:rPr lang="en-US" sz="2400" dirty="0" smtClean="0"/>
-              <a:t>Side: R doesn’t like a distance matrix of dim 8124 X 8124</a:t>
-            </a:r>
-            <a:r>
-              <a:rPr lang="en-US" sz="2400" dirty="0" smtClean="0"/>
-              <a:t> </a:t>
+              <a:t>Side: R doesn’t like a distance matrix of dim 8124 X 8124 </a:t>
             </a:r>
             <a:endParaRPr lang="en-US" sz="2400" dirty="0"/>
           </a:p>
@@ -10690,7 +10612,7 @@
     </p:spTree>
     <p:extLst>
       <p:ext uri="{BB962C8B-B14F-4D97-AF65-F5344CB8AC3E}">
-        <p14:creationId xmlns:p14="http://schemas.microsoft.com/office/powerpoint/2010/main" xmlns="" val="1675777127"/>
+        <p14:creationId xmlns="" xmlns:p14="http://schemas.microsoft.com/office/powerpoint/2010/main" val="1675777127"/>
       </p:ext>
     </p:extLst>
   </p:cSld>
@@ -10799,7 +10721,7 @@
           <a:blip r:embed="rId2">
             <a:extLst>
               <a:ext uri="{28A0092B-C50C-407E-A947-70E740481C1C}">
-                <a14:useLocalDpi xmlns:a14="http://schemas.microsoft.com/office/drawing/2010/main" xmlns="" val="0"/>
+                <a14:useLocalDpi xmlns="" xmlns:a14="http://schemas.microsoft.com/office/drawing/2010/main" val="0"/>
               </a:ext>
             </a:extLst>
           </a:blip>
@@ -10817,7 +10739,7 @@
     </p:spTree>
     <p:extLst>
       <p:ext uri="{BB962C8B-B14F-4D97-AF65-F5344CB8AC3E}">
-        <p14:creationId xmlns:p14="http://schemas.microsoft.com/office/powerpoint/2010/main" xmlns="" val="1766743681"/>
+        <p14:creationId xmlns="" xmlns:p14="http://schemas.microsoft.com/office/powerpoint/2010/main" val="1766743681"/>
       </p:ext>
     </p:extLst>
   </p:cSld>
@@ -10987,14 +10909,14 @@
           <a:noFill/>
           <a:extLst>
             <a:ext uri="{909E8E84-426E-40dd-AFC4-6F175D3DCCD1}">
-              <a14:hiddenFill xmlns:a14="http://schemas.microsoft.com/office/drawing/2010/main" xmlns="">
+              <a14:hiddenFill xmlns="" xmlns:a14="http://schemas.microsoft.com/office/drawing/2010/main">
                 <a:solidFill>
                   <a:srgbClr val="FFFFFF"/>
                 </a:solidFill>
               </a14:hiddenFill>
             </a:ext>
             <a:ext uri="{91240B29-F687-4f45-9708-019B960494DF}">
-              <a14:hiddenLine xmlns:a14="http://schemas.microsoft.com/office/drawing/2010/main" xmlns="" w="9525">
+              <a14:hiddenLine xmlns="" xmlns:a14="http://schemas.microsoft.com/office/drawing/2010/main" w="9525">
                 <a:solidFill>
                   <a:srgbClr val="000000"/>
                 </a:solidFill>
@@ -11178,14 +11100,14 @@
           <a:noFill/>
           <a:extLst>
             <a:ext uri="{909E8E84-426E-40dd-AFC4-6F175D3DCCD1}">
-              <a14:hiddenFill xmlns:a14="http://schemas.microsoft.com/office/drawing/2010/main" xmlns="">
+              <a14:hiddenFill xmlns="" xmlns:a14="http://schemas.microsoft.com/office/drawing/2010/main">
                 <a:solidFill>
                   <a:srgbClr val="FFFFFF"/>
                 </a:solidFill>
               </a14:hiddenFill>
             </a:ext>
             <a:ext uri="{91240B29-F687-4f45-9708-019B960494DF}">
-              <a14:hiddenLine xmlns:a14="http://schemas.microsoft.com/office/drawing/2010/main" xmlns="" w="9525">
+              <a14:hiddenLine xmlns="" xmlns:a14="http://schemas.microsoft.com/office/drawing/2010/main" w="9525">
                 <a:solidFill>
                   <a:srgbClr val="000000"/>
                 </a:solidFill>
@@ -11437,7 +11359,7 @@
                 <a:latin typeface="Calibri" charset="0"/>
                 <a:ea typeface="ＭＳ Ｐゴシック" charset="0"/>
               </a:rPr>
-              <a:t>Dataset</a:t>
+              <a:t>Data set</a:t>
             </a:r>
             <a:r>
               <a:rPr lang="en-US" altLang="zh-CN" sz="2800" b="1" dirty="0">
@@ -11550,10 +11472,6 @@
               </a:rPr>
               <a:t>in one attribute (2480)</a:t>
             </a:r>
-            <a:endParaRPr lang="en-US" altLang="zh-CN" sz="2600" dirty="0" smtClean="0">
-              <a:latin typeface="Calibri" charset="0"/>
-              <a:ea typeface="ＭＳ Ｐゴシック" charset="0"/>
-            </a:endParaRPr>
           </a:p>
           <a:p>
             <a:pPr marL="1371600" lvl="4" indent="-457200">
@@ -11565,19 +11483,8 @@
                 <a:latin typeface="Calibri" charset="0"/>
                 <a:ea typeface="ＭＳ Ｐゴシック" charset="0"/>
               </a:rPr>
-              <a:t>Not missing completely </a:t>
-            </a:r>
-            <a:r>
-              <a:rPr lang="en-US" altLang="zh-CN" sz="2600" dirty="0" smtClean="0">
-                <a:latin typeface="Calibri" charset="0"/>
-                <a:ea typeface="ＭＳ Ｐゴシック" charset="0"/>
-              </a:rPr>
-              <a:t>at random</a:t>
-            </a:r>
-            <a:endParaRPr lang="en-US" altLang="zh-CN" sz="2600" dirty="0" smtClean="0">
-              <a:latin typeface="Calibri" charset="0"/>
-              <a:ea typeface="ＭＳ Ｐゴシック" charset="0"/>
-            </a:endParaRPr>
+              <a:t>Not missing completely at random</a:t>
+            </a:r>
           </a:p>
           <a:p>
             <a:pPr marL="1371600" lvl="4" indent="-457200">
@@ -11662,7 +11569,7 @@
     </p:spTree>
     <p:extLst>
       <p:ext uri="{BB962C8B-B14F-4D97-AF65-F5344CB8AC3E}">
-        <p14:creationId xmlns:p14="http://schemas.microsoft.com/office/powerpoint/2010/main" xmlns="" val="784172979"/>
+        <p14:creationId xmlns="" xmlns:p14="http://schemas.microsoft.com/office/powerpoint/2010/main" val="784172979"/>
       </p:ext>
     </p:extLst>
   </p:cSld>
@@ -11723,7 +11630,7 @@
         </p:txBody>
       </p:sp>
       <mc:AlternateContent xmlns:mc="http://schemas.openxmlformats.org/markup-compatibility/2006">
-        <mc:Choice xmlns:a14="http://schemas.microsoft.com/office/drawing/2010/main" xmlns="" Requires="a14">
+        <mc:Choice xmlns="" xmlns:a14="http://schemas.microsoft.com/office/drawing/2010/main" Requires="a14">
           <p:sp>
             <p:nvSpPr>
               <p:cNvPr id="3" name="内容占位符 2"/>
@@ -11998,7 +11905,7 @@
     </p:spTree>
     <p:extLst>
       <p:ext uri="{BB962C8B-B14F-4D97-AF65-F5344CB8AC3E}">
-        <p14:creationId xmlns:p14="http://schemas.microsoft.com/office/powerpoint/2010/main" xmlns="" val="676677402"/>
+        <p14:creationId xmlns="" xmlns:p14="http://schemas.microsoft.com/office/powerpoint/2010/main" val="676677402"/>
       </p:ext>
     </p:extLst>
   </p:cSld>
@@ -12059,7 +11966,7 @@
         </p:txBody>
       </p:sp>
       <mc:AlternateContent xmlns:mc="http://schemas.openxmlformats.org/markup-compatibility/2006">
-        <mc:Choice xmlns:a14="http://schemas.microsoft.com/office/drawing/2010/main" xmlns="" Requires="a14">
+        <mc:Choice xmlns="" xmlns:a14="http://schemas.microsoft.com/office/drawing/2010/main" Requires="a14">
           <p:sp>
             <p:nvSpPr>
               <p:cNvPr id="3" name="内容占位符 2"/>
@@ -12625,7 +12532,7 @@
     </p:spTree>
     <p:extLst>
       <p:ext uri="{BB962C8B-B14F-4D97-AF65-F5344CB8AC3E}">
-        <p14:creationId xmlns:p14="http://schemas.microsoft.com/office/powerpoint/2010/main" xmlns="" val="1814670226"/>
+        <p14:creationId xmlns="" xmlns:p14="http://schemas.microsoft.com/office/powerpoint/2010/main" val="1814670226"/>
       </p:ext>
     </p:extLst>
   </p:cSld>
@@ -12710,13 +12617,8 @@
             </a:pPr>
             <a:r>
               <a:rPr kumimoji="1" lang="en-US" altLang="zh-CN" sz="2800" b="1" dirty="0" smtClean="0"/>
-              <a:t>Classification </a:t>
-            </a:r>
-            <a:r>
-              <a:rPr kumimoji="1" lang="en-US" altLang="zh-CN" sz="2800" b="1" dirty="0" smtClean="0"/>
-              <a:t>Rule</a:t>
-            </a:r>
-            <a:endParaRPr kumimoji="1" lang="en-US" altLang="zh-CN" sz="2800" b="1" dirty="0" smtClean="0"/>
+              <a:t>Classification Rule</a:t>
+            </a:r>
           </a:p>
           <a:p>
             <a:pPr marL="228600" lvl="1" indent="0">
@@ -12724,15 +12626,7 @@
             </a:pPr>
             <a:r>
               <a:rPr kumimoji="1" lang="en-US" altLang="zh-CN" sz="2800" dirty="0" smtClean="0"/>
-              <a:t>In </a:t>
-            </a:r>
-            <a:r>
-              <a:rPr kumimoji="1" lang="en-US" altLang="zh-CN" sz="2800" dirty="0" smtClean="0"/>
-              <a:t>Binary classification, a threshold is utilized</a:t>
-            </a:r>
-            <a:r>
-              <a:rPr kumimoji="1" lang="en-US" altLang="zh-CN" sz="2800" dirty="0" smtClean="0"/>
-              <a:t>:</a:t>
+              <a:t>In Binary classification, a threshold is utilized:</a:t>
             </a:r>
           </a:p>
           <a:p>
@@ -12769,7 +12663,6 @@
               <a:rPr kumimoji="1" lang="en-US" altLang="zh-CN" sz="2800" dirty="0" smtClean="0"/>
               <a:t>Multi-class: </a:t>
             </a:r>
-            <a:endParaRPr kumimoji="1" lang="en-US" altLang="zh-CN" sz="2800" dirty="0" smtClean="0"/>
           </a:p>
           <a:p>
             <a:pPr lvl="2">
@@ -12778,11 +12671,7 @@
             </a:pPr>
             <a:r>
               <a:rPr kumimoji="1" lang="en-US" altLang="zh-CN" sz="2800" dirty="0" smtClean="0"/>
-              <a:t> </a:t>
-            </a:r>
-            <a:r>
-              <a:rPr kumimoji="1" lang="en-US" altLang="zh-CN" sz="2800" dirty="0" smtClean="0"/>
-              <a:t>	Assign instance to most probable class</a:t>
+              <a:t> 	Assign instance to most probable class</a:t>
             </a:r>
           </a:p>
         </p:txBody>
@@ -12848,7 +12737,7 @@
     </p:spTree>
     <p:extLst>
       <p:ext uri="{BB962C8B-B14F-4D97-AF65-F5344CB8AC3E}">
-        <p14:creationId xmlns:p14="http://schemas.microsoft.com/office/powerpoint/2010/main" xmlns="" val="3523709704"/>
+        <p14:creationId xmlns="" xmlns:p14="http://schemas.microsoft.com/office/powerpoint/2010/main" val="3523709704"/>
       </p:ext>
     </p:extLst>
   </p:cSld>
@@ -12953,11 +12842,11 @@
             </a:pPr>
             <a:r>
               <a:rPr kumimoji="1" lang="en-US" altLang="zh-CN" sz="2800" dirty="0" smtClean="0"/>
-              <a:t>Dataset is split into six equally-sized </a:t>
+              <a:t>Data set </a:t>
             </a:r>
             <a:r>
               <a:rPr kumimoji="1" lang="en-US" altLang="zh-CN" sz="2800" dirty="0" smtClean="0"/>
-              <a:t>folds</a:t>
+              <a:t>is split into six equally-sized folds</a:t>
             </a:r>
           </a:p>
           <a:p>
@@ -12967,11 +12856,7 @@
             </a:pPr>
             <a:r>
               <a:rPr kumimoji="1" lang="en-US" altLang="zh-CN" sz="2800" dirty="0" smtClean="0"/>
-              <a:t>Apply </a:t>
-            </a:r>
-            <a:r>
-              <a:rPr kumimoji="1" lang="en-US" altLang="zh-CN" sz="2800" dirty="0" smtClean="0"/>
-              <a:t>Naïve </a:t>
+              <a:t>Apply Naïve </a:t>
             </a:r>
             <a:r>
               <a:rPr kumimoji="1" lang="en-US" altLang="zh-CN" sz="2800" dirty="0" err="1" smtClean="0"/>
@@ -12979,13 +12864,8 @@
             </a:r>
             <a:r>
               <a:rPr kumimoji="1" lang="en-US" altLang="zh-CN" sz="2800" dirty="0" smtClean="0"/>
-              <a:t> </a:t>
-            </a:r>
-            <a:r>
-              <a:rPr kumimoji="1" lang="en-US" altLang="zh-CN" sz="2800" dirty="0" smtClean="0"/>
-              <a:t>once for each run</a:t>
-            </a:r>
-            <a:endParaRPr kumimoji="1" lang="en-US" altLang="zh-CN" sz="2800" dirty="0" smtClean="0"/>
+              <a:t> once for each run</a:t>
+            </a:r>
           </a:p>
           <a:p>
             <a:pPr lvl="3">
@@ -12996,7 +12876,6 @@
               <a:rPr kumimoji="1" lang="en-US" altLang="zh-CN" sz="2800" dirty="0" smtClean="0"/>
               <a:t>Each time: </a:t>
             </a:r>
-            <a:endParaRPr kumimoji="1" lang="en-US" altLang="zh-CN" sz="2800" dirty="0" smtClean="0"/>
           </a:p>
           <a:p>
             <a:pPr lvl="5">
@@ -13012,8 +12891,14 @@
                 </a:solidFill>
                 <a:latin typeface="Calibri" pitchFamily="34" charset="0"/>
               </a:rPr>
-              <a:t>F</a:t>
-            </a:r>
+              <a:t>Five folds as training set</a:t>
+            </a:r>
+          </a:p>
+          <a:p>
+            <a:pPr lvl="5">
+              <a:buFont typeface="Arial" panose="020B0604020202020204" pitchFamily="34" charset="0"/>
+              <a:buChar char="•"/>
+            </a:pPr>
             <a:r>
               <a:rPr kumimoji="1" lang="en-US" altLang="zh-CN" sz="2800" dirty="0" smtClean="0">
                 <a:solidFill>
@@ -13023,55 +12908,8 @@
                 </a:solidFill>
                 <a:latin typeface="Calibri" pitchFamily="34" charset="0"/>
               </a:rPr>
-              <a:t>ive folds as training set</a:t>
-            </a:r>
-          </a:p>
-          <a:p>
-            <a:pPr lvl="5">
-              <a:buFont typeface="Arial" panose="020B0604020202020204" pitchFamily="34" charset="0"/>
-              <a:buChar char="•"/>
-            </a:pPr>
-            <a:r>
-              <a:rPr kumimoji="1" lang="en-US" altLang="zh-CN" sz="2800" dirty="0" smtClean="0">
-                <a:solidFill>
-                  <a:schemeClr val="tx2">
-                    <a:lumMod val="50000"/>
-                  </a:schemeClr>
-                </a:solidFill>
-                <a:latin typeface="Calibri" pitchFamily="34" charset="0"/>
-              </a:rPr>
-              <a:t>Remaining one as </a:t>
-            </a:r>
-            <a:r>
-              <a:rPr kumimoji="1" lang="en-US" altLang="zh-CN" sz="2800" dirty="0" smtClean="0">
-                <a:solidFill>
-                  <a:schemeClr val="tx2">
-                    <a:lumMod val="50000"/>
-                  </a:schemeClr>
-                </a:solidFill>
-                <a:latin typeface="Calibri" pitchFamily="34" charset="0"/>
-              </a:rPr>
-              <a:t>test </a:t>
-            </a:r>
-            <a:r>
-              <a:rPr kumimoji="1" lang="en-US" altLang="zh-CN" sz="2800" dirty="0" smtClean="0">
-                <a:solidFill>
-                  <a:schemeClr val="tx2">
-                    <a:lumMod val="50000"/>
-                  </a:schemeClr>
-                </a:solidFill>
-                <a:latin typeface="Calibri" pitchFamily="34" charset="0"/>
-              </a:rPr>
-              <a:t>set</a:t>
-            </a:r>
-            <a:endParaRPr kumimoji="1" lang="en-US" altLang="zh-CN" sz="2800" dirty="0" smtClean="0">
-              <a:solidFill>
-                <a:schemeClr val="tx2">
-                  <a:lumMod val="50000"/>
-                </a:schemeClr>
-              </a:solidFill>
-              <a:latin typeface="Calibri" pitchFamily="34" charset="0"/>
-            </a:endParaRPr>
+              <a:t>Remaining one as test set</a:t>
+            </a:r>
           </a:p>
           <a:p>
             <a:pPr lvl="5">
@@ -13149,7 +12987,7 @@
     </p:spTree>
     <p:extLst>
       <p:ext uri="{BB962C8B-B14F-4D97-AF65-F5344CB8AC3E}">
-        <p14:creationId xmlns:p14="http://schemas.microsoft.com/office/powerpoint/2010/main" xmlns="" val="3723105540"/>
+        <p14:creationId xmlns="" xmlns:p14="http://schemas.microsoft.com/office/powerpoint/2010/main" val="3723105540"/>
       </p:ext>
     </p:extLst>
   </p:cSld>
@@ -13436,7 +13274,7 @@
     </p:spTree>
     <p:extLst>
       <p:ext uri="{BB962C8B-B14F-4D97-AF65-F5344CB8AC3E}">
-        <p14:creationId xmlns:p14="http://schemas.microsoft.com/office/powerpoint/2010/main" xmlns="" val="1256611496"/>
+        <p14:creationId xmlns="" xmlns:p14="http://schemas.microsoft.com/office/powerpoint/2010/main" val="1256611496"/>
       </p:ext>
     </p:extLst>
   </p:cSld>
@@ -13521,11 +13359,7 @@
             </a:pPr>
             <a:r>
               <a:rPr lang="en-US" sz="2800" b="1" dirty="0" smtClean="0"/>
-              <a:t>R </a:t>
-            </a:r>
-            <a:r>
-              <a:rPr lang="en-US" sz="2800" b="1" dirty="0" smtClean="0"/>
-              <a:t>packages</a:t>
+              <a:t>R packages</a:t>
             </a:r>
           </a:p>
           <a:p>
@@ -13594,11 +13428,7 @@
             </a:pPr>
             <a:r>
               <a:rPr lang="en-US" sz="2400" dirty="0" smtClean="0"/>
-              <a:t>	</a:t>
-            </a:r>
-            <a:r>
-              <a:rPr lang="en-US" sz="2400" dirty="0" smtClean="0"/>
-              <a:t>library(ROCR </a:t>
+              <a:t>	library(ROCR </a:t>
             </a:r>
             <a:r>
               <a:rPr lang="en-US" sz="2400" dirty="0"/>
@@ -13703,7 +13533,7 @@
     </p:spTree>
     <p:extLst>
       <p:ext uri="{BB962C8B-B14F-4D97-AF65-F5344CB8AC3E}">
-        <p14:creationId xmlns:p14="http://schemas.microsoft.com/office/powerpoint/2010/main" xmlns="" val="1886790651"/>
+        <p14:creationId xmlns="" xmlns:p14="http://schemas.microsoft.com/office/powerpoint/2010/main" val="1886790651"/>
       </p:ext>
     </p:extLst>
   </p:cSld>

</xml_diff>